<commit_message>
Added episode 23 - Spy added
</commit_message>
<xml_diff>
--- a/Presentations/23- Clean Code - Advanced TDD - Mocking.pptx
+++ b/Presentations/23- Clean Code - Advanced TDD - Mocking.pptx
@@ -5,10 +5,10 @@
     <p:sldMasterId id="2147483648" r:id="rId4"/>
   </p:sldMasterIdLst>
   <p:notesMasterIdLst>
-    <p:notesMasterId r:id="rId16"/>
+    <p:notesMasterId r:id="rId17"/>
   </p:notesMasterIdLst>
   <p:handoutMasterIdLst>
-    <p:handoutMasterId r:id="rId17"/>
+    <p:handoutMasterId r:id="rId18"/>
   </p:handoutMasterIdLst>
   <p:sldIdLst>
     <p:sldId id="449" r:id="rId5"/>
@@ -21,12 +21,13 @@
     <p:sldId id="456" r:id="rId12"/>
     <p:sldId id="457" r:id="rId13"/>
     <p:sldId id="458" r:id="rId14"/>
-    <p:sldId id="422" r:id="rId15"/>
+    <p:sldId id="459" r:id="rId15"/>
+    <p:sldId id="422" r:id="rId16"/>
   </p:sldIdLst>
   <p:sldSz cx="12192000" cy="6858000"/>
   <p:notesSz cx="6858000" cy="9144000"/>
   <p:custDataLst>
-    <p:tags r:id="rId18"/>
+    <p:tags r:id="rId19"/>
   </p:custDataLst>
   <p:defaultTextStyle>
     <a:defPPr>
@@ -242,7 +243,7 @@
           <a:p>
             <a:fld id="{D54D4046-5866-459D-BEB5-A0B0377E3E3F}" type="datetime1">
               <a:rPr lang="en-US" sz="1000" smtClean="0"/>
-              <a:t>3/6/23</a:t>
+              <a:t>3/8/23</a:t>
             </a:fld>
             <a:endParaRPr lang="en-US" sz="1000"/>
           </a:p>
@@ -422,6 +423,34 @@
 </inkml:ink>
 </file>
 
+<file path=ppt/ink/ink4.xml><?xml version="1.0" encoding="utf-8"?>
+<inkml:ink xmlns:inkml="http://www.w3.org/2003/InkML">
+  <inkml:definitions>
+    <inkml:context xml:id="ctx0">
+      <inkml:inkSource xml:id="inkSrc0">
+        <inkml:traceFormat>
+          <inkml:channel name="X" type="integer" min="-2.14748E9" max="2.14748E9" units="cm"/>
+          <inkml:channel name="Y" type="integer" min="-2.14748E9" max="2.14748E9" units="cm"/>
+          <inkml:channel name="F" type="integer" max="32767" units="dev"/>
+        </inkml:traceFormat>
+        <inkml:channelProperties>
+          <inkml:channelProperty channel="X" name="resolution" value="1000" units="1/cm"/>
+          <inkml:channelProperty channel="Y" name="resolution" value="1000" units="1/cm"/>
+          <inkml:channelProperty channel="F" name="resolution" value="0" units="1/dev"/>
+        </inkml:channelProperties>
+      </inkml:inkSource>
+      <inkml:timestamp xml:id="ts0" timeString="2023-03-06T07:26:44.477"/>
+    </inkml:context>
+    <inkml:brush xml:id="br0">
+      <inkml:brushProperty name="width" value="0.05" units="cm"/>
+      <inkml:brushProperty name="height" value="0.05" units="cm"/>
+      <inkml:brushProperty name="color" value="#FFC114"/>
+    </inkml:brush>
+  </inkml:definitions>
+  <inkml:trace contextRef="#ctx0" brushRef="#br0">1105 11 24575,'-62'-2'0,"-27"-1"0,31 1 0,-3 1 0,1 0 0,0 1 0,5-1 0,2 1 0,-23 2 0,17 3 0,8 4 0,-1 8 0,-1 7 0,-1 6 0,6 5 0,10 1 0,7 3 0,3 4 0,1 3 0,1 0 0,4-3 0,5-3 0,6-4 0,4-4 0,2-2 0,3-2 0,2 0 0,4 3 0,5 4 0,6 3 0,6 2 0,4-1 0,6 0 0,6 0 0,8 0 0,12-2 0,11-2 0,10-2 0,0-6 0,-2-4 0,-3-3 0,4-3 0,5-2 0,1-2 0,-3-2 0,-14-2 0,-13-2 0,-12-1 0,3 0 0,10 1 0,19 2 0,18 2 0,1-1 0,-12-1 0,-21-4 0,-21-1 0,-10-1 0,-3-1 0,6 0 0,9 1 0,10 0 0,7-1 0,8 2 0,2-1 0,2 0 0,3 1 0,4-2 0,11 0 0,12-1 0,-45-1 0,2 0 0,0 0 0,-1 0 0,-1 0 0,-1 0 0,42 0 0,-16 0 0,-10-1 0,-10-1 0,-9-3 0,-8 0 0,-5-1 0,-3 1 0,2-1 0,-1-2 0,-2-3 0,1-5 0,-2-2 0,3-5 0,-1 1 0,-4 0 0,-6-1 0,-4-3 0,0-8 0,1-8 0,-1-5 0,-3 0 0,-4 1 0,-5 2 0,0 3 0,-2 0 0,0 3 0,-1-2 0,-1 3 0,-1 0 0,-2 2 0,-2 2 0,-1 3 0,-2 4 0,-2 0 0,-5 0 0,-5-2 0,-4 0 0,-1 2 0,1 3 0,2 4 0,1 5 0,-2 1 0,-7 1 0,-8-1 0,-7 2 0,-3 1 0,4 3 0,0 2 0,1 1 0,-3-1 0,-5 0 0,-2 0 0,4 0 0,8 1 0,3 1 0,-3 0 0,-8 0 0,-6 0 0,3 0 0,8 0 0,6 1 0,-1 0 0,-8 0 0,-10 0 0,-4 0 0,0-1 0,5 0 0,11-1 0,6 1 0,6 0 0,3 1 0,1 1 0,-5-1 0,-3 0 0,0 1 0,0 1 0,1 0 0,-8 1 0,-6-1 0,2-1 0,6 0 0,5-2 0,2 0 0,-2 0 0,-5 0 0,4 1 0,6 0 0,0 0 0,1 1 0,-5-1 0,-4 1 0,-2-1 0,2 0 0,2 1 0,5-1 0,7 1 0,4 0 0,-3 1 0,-3-1 0,-3 0 0,0 0 0,6 0 0,3 1 0,1 0 0,2 0 0,0 0 0,1-1 0,2 0 0,1-1 0,0 1 0,3 1 0,0 0 0,2 0 0,0 0 0,2 0 0,2-1 0,1 0 0,0 0 0</inkml:trace>
+</inkml:ink>
+</file>
+
 <file path=ppt/notesMasters/notesMaster1.xml><?xml version="1.0" encoding="utf-8"?>
 <p:notesMaster xmlns:a="http://schemas.openxmlformats.org/drawingml/2006/main" xmlns:r="http://schemas.openxmlformats.org/officeDocument/2006/relationships" xmlns:p="http://schemas.openxmlformats.org/presentationml/2006/main">
   <p:cSld>
@@ -475,7 +504,7 @@
           <a:p>
             <a:fld id="{86CA08A8-CD0A-4CED-A7DF-8FE5DAE0B145}" type="datetime1">
               <a:rPr lang="en-US" smtClean="0"/>
-              <a:t>3/6/23</a:t>
+              <a:t>3/8/23</a:t>
             </a:fld>
             <a:endParaRPr lang="en-US" dirty="0"/>
           </a:p>
@@ -841,7 +870,7 @@
           <a:p>
             <a:fld id="{3CB1730B-F0FD-4857-ADC5-05FFCBB96A2D}" type="datetime1">
               <a:rPr lang="en-US" smtClean="0"/>
-              <a:t>3/6/23</a:t>
+              <a:t>3/8/23</a:t>
             </a:fld>
             <a:endParaRPr lang="en-US" dirty="0"/>
           </a:p>
@@ -978,7 +1007,7 @@
           <a:p>
             <a:fld id="{AD73FA9E-13CA-4D34-8989-6ECB15E9C63C}" type="datetime1">
               <a:rPr lang="en-US" smtClean="0"/>
-              <a:t>3/6/23</a:t>
+              <a:t>3/8/23</a:t>
             </a:fld>
             <a:endParaRPr lang="en-US" dirty="0"/>
           </a:p>
@@ -1008,7 +1037,7 @@
             <a:fld id="{78ADB214-F42C-4297-A187-8792AE2D2F13}" type="slidenum">
               <a:rPr lang="en-US" smtClean="0"/>
               <a:pPr/>
-              <a:t>11</a:t>
+              <a:t>12</a:t>
             </a:fld>
             <a:endParaRPr lang="en-US" dirty="0"/>
           </a:p>
@@ -9565,8 +9594,8 @@
           </a:prstGeom>
         </p:spPr>
       </p:pic>
-      <mc:AlternateContent xmlns:mc="http://schemas.openxmlformats.org/markup-compatibility/2006">
-        <mc:Choice xmlns:p14="http://schemas.microsoft.com/office/powerpoint/2010/main" Requires="p14">
+      <mc:AlternateContent xmlns:mc="http://schemas.openxmlformats.org/markup-compatibility/2006" xmlns:p14="http://schemas.microsoft.com/office/powerpoint/2010/main">
+        <mc:Choice Requires="p14">
           <p:contentPart p14:bwMode="auto" r:id="rId3">
             <p14:nvContentPartPr>
               <p14:cNvPr id="7" name="Ink 6">
@@ -9585,7 +9614,7 @@
             </p14:xfrm>
           </p:contentPart>
         </mc:Choice>
-        <mc:Fallback>
+        <mc:Fallback xmlns="">
           <p:pic>
             <p:nvPicPr>
               <p:cNvPr id="7" name="Ink 6">
@@ -9787,6 +9816,399 @@
 </file>
 
 <file path=ppt/slides/slide11.xml><?xml version="1.0" encoding="utf-8"?>
+<p:sld xmlns:a="http://schemas.openxmlformats.org/drawingml/2006/main" xmlns:r="http://schemas.openxmlformats.org/officeDocument/2006/relationships" xmlns:p="http://schemas.openxmlformats.org/presentationml/2006/main">
+  <p:cSld>
+    <p:spTree>
+      <p:nvGrpSpPr>
+        <p:cNvPr id="1" name=""/>
+        <p:cNvGrpSpPr/>
+        <p:nvPr/>
+      </p:nvGrpSpPr>
+      <p:grpSpPr>
+        <a:xfrm>
+          <a:off x="0" y="0"/>
+          <a:ext cx="0" cy="0"/>
+          <a:chOff x="0" y="0"/>
+          <a:chExt cx="0" cy="0"/>
+        </a:xfrm>
+      </p:grpSpPr>
+      <p:sp>
+        <p:nvSpPr>
+          <p:cNvPr id="2" name="Title 1">
+            <a:extLst>
+              <a:ext uri="{FF2B5EF4-FFF2-40B4-BE49-F238E27FC236}">
+                <a16:creationId xmlns:a16="http://schemas.microsoft.com/office/drawing/2014/main" id="{DC85130C-ECCE-82EC-6401-213862135DC2}"/>
+              </a:ext>
+            </a:extLst>
+          </p:cNvPr>
+          <p:cNvSpPr>
+            <a:spLocks noGrp="1"/>
+          </p:cNvSpPr>
+          <p:nvPr>
+            <p:ph type="title"/>
+          </p:nvPr>
+        </p:nvSpPr>
+        <p:spPr/>
+        <p:txBody>
+          <a:bodyPr/>
+          <a:lstStyle/>
+          <a:p>
+            <a:r>
+              <a:rPr lang="en-US" dirty="0"/>
+              <a:t>The Spy</a:t>
+            </a:r>
+          </a:p>
+        </p:txBody>
+      </p:sp>
+      <p:sp>
+        <p:nvSpPr>
+          <p:cNvPr id="6" name="TextBox 5">
+            <a:extLst>
+              <a:ext uri="{FF2B5EF4-FFF2-40B4-BE49-F238E27FC236}">
+                <a16:creationId xmlns:a16="http://schemas.microsoft.com/office/drawing/2014/main" id="{2D5019FF-F8CC-0A1B-35C6-BB57664D780F}"/>
+              </a:ext>
+            </a:extLst>
+          </p:cNvPr>
+          <p:cNvSpPr txBox="1"/>
+          <p:nvPr/>
+        </p:nvSpPr>
+        <p:spPr>
+          <a:xfrm>
+            <a:off x="3773742" y="1371600"/>
+            <a:ext cx="6426714" cy="840230"/>
+          </a:xfrm>
+          <a:prstGeom prst="rect">
+            <a:avLst/>
+          </a:prstGeom>
+          <a:solidFill>
+            <a:srgbClr val="7030A0"/>
+          </a:solidFill>
+          <a:ln>
+            <a:noFill/>
+          </a:ln>
+        </p:spPr>
+        <p:txBody>
+          <a:bodyPr wrap="square" rtlCol="0">
+            <a:spAutoFit/>
+          </a:bodyPr>
+          <a:lstStyle/>
+          <a:p>
+            <a:pPr algn="l">
+              <a:lnSpc>
+                <a:spcPct val="90000"/>
+              </a:lnSpc>
+              <a:spcBef>
+                <a:spcPts val="1200"/>
+              </a:spcBef>
+            </a:pPr>
+            <a:r>
+              <a:rPr lang="en-GB" sz="1800" dirty="0">
+                <a:solidFill>
+                  <a:srgbClr val="48ED00"/>
+                </a:solidFill>
+                <a:effectLst/>
+                <a:latin typeface="Calibri" panose="020F0502020204030204" pitchFamily="34" charset="0"/>
+                <a:ea typeface="Times New Roman" panose="02020603050405020304" pitchFamily="18" charset="0"/>
+                <a:cs typeface="Times New Roman" panose="02020603050405020304" pitchFamily="18" charset="0"/>
+              </a:rPr>
+              <a:t>The Spy is just a Stub does nothing, but returns values useful to the test. However, the Spy remembers facts about the way in which it was called and reports those facts back</a:t>
+            </a:r>
+            <a:endParaRPr lang="en-US" sz="2000" dirty="0">
+              <a:solidFill>
+                <a:srgbClr val="48ED00"/>
+              </a:solidFill>
+            </a:endParaRPr>
+          </a:p>
+        </p:txBody>
+      </p:sp>
+      <p:pic>
+        <p:nvPicPr>
+          <p:cNvPr id="3" name="Picture 2">
+            <a:extLst>
+              <a:ext uri="{FF2B5EF4-FFF2-40B4-BE49-F238E27FC236}">
+                <a16:creationId xmlns:a16="http://schemas.microsoft.com/office/drawing/2014/main" id="{61D364B3-1485-B4D9-5121-607453FC680E}"/>
+              </a:ext>
+            </a:extLst>
+          </p:cNvPr>
+          <p:cNvPicPr>
+            <a:picLocks noChangeAspect="1"/>
+          </p:cNvPicPr>
+          <p:nvPr/>
+        </p:nvPicPr>
+        <p:blipFill>
+          <a:blip r:embed="rId2">
+            <a:extLst>
+              <a:ext uri="{28A0092B-C50C-407E-A947-70E740481C1C}">
+                <a14:useLocalDpi xmlns:a14="http://schemas.microsoft.com/office/drawing/2010/main" val="0"/>
+              </a:ext>
+            </a:extLst>
+          </a:blip>
+          <a:stretch>
+            <a:fillRect/>
+          </a:stretch>
+        </p:blipFill>
+        <p:spPr>
+          <a:xfrm>
+            <a:off x="335280" y="1457549"/>
+            <a:ext cx="2984145" cy="2691531"/>
+          </a:xfrm>
+          <a:prstGeom prst="rect">
+            <a:avLst/>
+          </a:prstGeom>
+        </p:spPr>
+      </p:pic>
+      <mc:AlternateContent xmlns:mc="http://schemas.openxmlformats.org/markup-compatibility/2006">
+        <mc:Choice xmlns:p14="http://schemas.microsoft.com/office/powerpoint/2010/main" Requires="p14">
+          <p:contentPart p14:bwMode="auto" r:id="rId3">
+            <p14:nvContentPartPr>
+              <p14:cNvPr id="7" name="Ink 6">
+                <a:extLst>
+                  <a:ext uri="{FF2B5EF4-FFF2-40B4-BE49-F238E27FC236}">
+                    <a16:creationId xmlns:a16="http://schemas.microsoft.com/office/drawing/2014/main" id="{520EF2AC-EB13-853A-7CAE-59A82596DF0C}"/>
+                  </a:ext>
+                </a:extLst>
+              </p14:cNvPr>
+              <p14:cNvContentPartPr/>
+              <p14:nvPr/>
+            </p14:nvContentPartPr>
+            <p14:xfrm>
+              <a:off x="1050611" y="3209760"/>
+              <a:ext cx="1308600" cy="438480"/>
+            </p14:xfrm>
+          </p:contentPart>
+        </mc:Choice>
+        <mc:Fallback>
+          <p:pic>
+            <p:nvPicPr>
+              <p:cNvPr id="7" name="Ink 6">
+                <a:extLst>
+                  <a:ext uri="{FF2B5EF4-FFF2-40B4-BE49-F238E27FC236}">
+                    <a16:creationId xmlns:a16="http://schemas.microsoft.com/office/drawing/2014/main" id="{520EF2AC-EB13-853A-7CAE-59A82596DF0C}"/>
+                  </a:ext>
+                </a:extLst>
+              </p:cNvPr>
+              <p:cNvPicPr/>
+              <p:nvPr/>
+            </p:nvPicPr>
+            <p:blipFill>
+              <a:blip r:embed="rId4"/>
+              <a:stretch>
+                <a:fillRect/>
+              </a:stretch>
+            </p:blipFill>
+            <p:spPr>
+              <a:xfrm>
+                <a:off x="1041611" y="3200760"/>
+                <a:ext cx="1326240" cy="456120"/>
+              </a:xfrm>
+              <a:prstGeom prst="rect">
+                <a:avLst/>
+              </a:prstGeom>
+            </p:spPr>
+          </p:pic>
+        </mc:Fallback>
+      </mc:AlternateContent>
+      <p:sp>
+        <p:nvSpPr>
+          <p:cNvPr id="10" name="TextBox 9">
+            <a:extLst>
+              <a:ext uri="{FF2B5EF4-FFF2-40B4-BE49-F238E27FC236}">
+                <a16:creationId xmlns:a16="http://schemas.microsoft.com/office/drawing/2014/main" id="{247969F1-7C9B-6F6E-622F-3EF2AE4C9E0C}"/>
+              </a:ext>
+            </a:extLst>
+          </p:cNvPr>
+          <p:cNvSpPr txBox="1"/>
+          <p:nvPr/>
+        </p:nvSpPr>
+        <p:spPr>
+          <a:xfrm>
+            <a:off x="1035264" y="5058819"/>
+            <a:ext cx="1584176" cy="341632"/>
+          </a:xfrm>
+          <a:prstGeom prst="rect">
+            <a:avLst/>
+          </a:prstGeom>
+          <a:noFill/>
+          <a:ln>
+            <a:noFill/>
+          </a:ln>
+        </p:spPr>
+        <p:txBody>
+          <a:bodyPr wrap="square" rtlCol="0">
+            <a:spAutoFit/>
+          </a:bodyPr>
+          <a:lstStyle/>
+          <a:p>
+            <a:pPr algn="l">
+              <a:lnSpc>
+                <a:spcPct val="90000"/>
+              </a:lnSpc>
+              <a:spcBef>
+                <a:spcPts val="1200"/>
+              </a:spcBef>
+            </a:pPr>
+            <a:r>
+              <a:rPr lang="en-GB" sz="1800" dirty="0">
+                <a:effectLst/>
+                <a:latin typeface="Calibri" panose="020F0502020204030204" pitchFamily="34" charset="0"/>
+                <a:ea typeface="Times New Roman" panose="02020603050405020304" pitchFamily="18" charset="0"/>
+                <a:cs typeface="Times New Roman" panose="02020603050405020304" pitchFamily="18" charset="0"/>
+              </a:rPr>
+              <a:t>See the code</a:t>
+            </a:r>
+            <a:endParaRPr lang="en-US" sz="2000" dirty="0">
+              <a:solidFill>
+                <a:srgbClr val="FFD579"/>
+              </a:solidFill>
+            </a:endParaRPr>
+          </a:p>
+        </p:txBody>
+      </p:sp>
+      <p:sp>
+        <p:nvSpPr>
+          <p:cNvPr id="8" name="TextBox 7">
+            <a:extLst>
+              <a:ext uri="{FF2B5EF4-FFF2-40B4-BE49-F238E27FC236}">
+                <a16:creationId xmlns:a16="http://schemas.microsoft.com/office/drawing/2014/main" id="{29B7CF77-3BA0-006F-E464-C1B9C71FCB7F}"/>
+              </a:ext>
+            </a:extLst>
+          </p:cNvPr>
+          <p:cNvSpPr txBox="1"/>
+          <p:nvPr/>
+        </p:nvSpPr>
+        <p:spPr>
+          <a:xfrm>
+            <a:off x="6692332" y="2624605"/>
+            <a:ext cx="3538010" cy="840230"/>
+          </a:xfrm>
+          <a:prstGeom prst="rect">
+            <a:avLst/>
+          </a:prstGeom>
+          <a:solidFill>
+            <a:schemeClr val="accent6"/>
+          </a:solidFill>
+          <a:ln>
+            <a:noFill/>
+          </a:ln>
+        </p:spPr>
+        <p:txBody>
+          <a:bodyPr wrap="square" rtlCol="0">
+            <a:spAutoFit/>
+          </a:bodyPr>
+          <a:lstStyle/>
+          <a:p>
+            <a:pPr algn="l">
+              <a:lnSpc>
+                <a:spcPct val="90000"/>
+              </a:lnSpc>
+              <a:spcBef>
+                <a:spcPts val="1200"/>
+              </a:spcBef>
+            </a:pPr>
+            <a:r>
+              <a:rPr lang="en-GB" sz="1800" dirty="0">
+                <a:solidFill>
+                  <a:schemeClr val="accent1">
+                    <a:lumMod val="60000"/>
+                    <a:lumOff val="40000"/>
+                  </a:schemeClr>
+                </a:solidFill>
+                <a:effectLst/>
+                <a:latin typeface="Calibri" panose="020F0502020204030204" pitchFamily="34" charset="0"/>
+                <a:ea typeface="Times New Roman" panose="02020603050405020304" pitchFamily="18" charset="0"/>
+                <a:cs typeface="Times New Roman" panose="02020603050405020304" pitchFamily="18" charset="0"/>
+              </a:rPr>
+              <a:t>Spies are useful to tell if a function was called and how many times a function was called</a:t>
+            </a:r>
+            <a:endParaRPr lang="en-US" sz="2000" dirty="0">
+              <a:solidFill>
+                <a:schemeClr val="accent1">
+                  <a:lumMod val="60000"/>
+                  <a:lumOff val="40000"/>
+                </a:schemeClr>
+              </a:solidFill>
+            </a:endParaRPr>
+          </a:p>
+        </p:txBody>
+      </p:sp>
+      <p:sp>
+        <p:nvSpPr>
+          <p:cNvPr id="4" name="TextBox 3">
+            <a:extLst>
+              <a:ext uri="{FF2B5EF4-FFF2-40B4-BE49-F238E27FC236}">
+                <a16:creationId xmlns:a16="http://schemas.microsoft.com/office/drawing/2014/main" id="{3DEC9A86-FA87-E349-96FF-22174018F19D}"/>
+              </a:ext>
+            </a:extLst>
+          </p:cNvPr>
+          <p:cNvSpPr txBox="1"/>
+          <p:nvPr/>
+        </p:nvSpPr>
+        <p:spPr>
+          <a:xfrm>
+            <a:off x="6701393" y="3900907"/>
+            <a:ext cx="3538010" cy="590931"/>
+          </a:xfrm>
+          <a:prstGeom prst="rect">
+            <a:avLst/>
+          </a:prstGeom>
+          <a:solidFill>
+            <a:srgbClr val="0070C0"/>
+          </a:solidFill>
+          <a:ln>
+            <a:noFill/>
+          </a:ln>
+        </p:spPr>
+        <p:txBody>
+          <a:bodyPr wrap="square" rtlCol="0">
+            <a:spAutoFit/>
+          </a:bodyPr>
+          <a:lstStyle/>
+          <a:p>
+            <a:pPr algn="l">
+              <a:lnSpc>
+                <a:spcPct val="90000"/>
+              </a:lnSpc>
+              <a:spcBef>
+                <a:spcPts val="1200"/>
+              </a:spcBef>
+            </a:pPr>
+            <a:r>
+              <a:rPr lang="en-GB" sz="1800" dirty="0">
+                <a:solidFill>
+                  <a:srgbClr val="FF85FF"/>
+                </a:solidFill>
+                <a:effectLst/>
+                <a:latin typeface="Calibri" panose="020F0502020204030204" pitchFamily="34" charset="0"/>
+                <a:ea typeface="Times New Roman" panose="02020603050405020304" pitchFamily="18" charset="0"/>
+                <a:cs typeface="Times New Roman" panose="02020603050405020304" pitchFamily="18" charset="0"/>
+              </a:rPr>
+              <a:t>Spies are useful to find out what arguments are passed in.</a:t>
+            </a:r>
+            <a:endParaRPr lang="en-US" sz="2000" dirty="0">
+              <a:solidFill>
+                <a:srgbClr val="FF85FF"/>
+              </a:solidFill>
+            </a:endParaRPr>
+          </a:p>
+        </p:txBody>
+      </p:sp>
+    </p:spTree>
+    <p:extLst>
+      <p:ext uri="{BB962C8B-B14F-4D97-AF65-F5344CB8AC3E}">
+        <p14:creationId xmlns:p14="http://schemas.microsoft.com/office/powerpoint/2010/main" val="3000632872"/>
+      </p:ext>
+    </p:extLst>
+  </p:cSld>
+  <p:clrMapOvr>
+    <a:masterClrMapping/>
+  </p:clrMapOvr>
+  <p:transition>
+    <p:fade/>
+  </p:transition>
+</p:sld>
+</file>
+
+<file path=ppt/slides/slide12.xml><?xml version="1.0" encoding="utf-8"?>
 <p:sld xmlns:a="http://schemas.openxmlformats.org/drawingml/2006/main" xmlns:r="http://schemas.openxmlformats.org/officeDocument/2006/relationships" xmlns:p="http://schemas.openxmlformats.org/presentationml/2006/main">
   <p:cSld>
     <p:spTree>
@@ -11576,8 +11998,8 @@
           </a:prstGeom>
         </p:spPr>
       </p:pic>
-      <mc:AlternateContent xmlns:mc="http://schemas.openxmlformats.org/markup-compatibility/2006">
-        <mc:Choice xmlns:p14="http://schemas.microsoft.com/office/powerpoint/2010/main" Requires="p14">
+      <mc:AlternateContent xmlns:mc="http://schemas.openxmlformats.org/markup-compatibility/2006" xmlns:p14="http://schemas.microsoft.com/office/powerpoint/2010/main">
+        <mc:Choice Requires="p14">
           <p:contentPart p14:bwMode="auto" r:id="rId3">
             <p14:nvContentPartPr>
               <p14:cNvPr id="7" name="Ink 6">
@@ -11596,7 +12018,7 @@
             </p14:xfrm>
           </p:contentPart>
         </mc:Choice>
-        <mc:Fallback>
+        <mc:Fallback xmlns="">
           <p:pic>
             <p:nvPicPr>
               <p:cNvPr id="7" name="Ink 6">
@@ -12546,6 +12968,15 @@
 </file>
 
 <file path=customXml/item1.xml><?xml version="1.0" encoding="utf-8"?>
+<?mso-contentType ?>
+<FormTemplates xmlns="http://schemas.microsoft.com/sharepoint/v3/contenttype/forms">
+  <Display>DocumentLibraryForm</Display>
+  <Edit>DocumentLibraryForm</Edit>
+  <New>DocumentLibraryForm</New>
+</FormTemplates>
+</file>
+
+<file path=customXml/item2.xml><?xml version="1.0" encoding="utf-8"?>
 <ct:contentTypeSchema xmlns:ct="http://schemas.microsoft.com/office/2006/metadata/contentType" xmlns:ma="http://schemas.microsoft.com/office/2006/metadata/properties/metaAttributes" ct:_="" ma:_="" ma:contentTypeName="Document" ma:contentTypeID="0x01010039F82FE1962BF246BB3FD51399502091" ma:contentTypeVersion="4" ma:contentTypeDescription="Create a new document." ma:contentTypeScope="" ma:versionID="a8c673c98f8b2fb74a666da82b1c2089">
   <xsd:schema xmlns:xsd="http://www.w3.org/2001/XMLSchema" xmlns:xs="http://www.w3.org/2001/XMLSchema" xmlns:p="http://schemas.microsoft.com/office/2006/metadata/properties" xmlns:ns2="87a905cf-b897-4a15-b4dd-a8e6e281c28b" xmlns:ns3="846e726d-930d-4acb-bd80-f2077a598691" targetNamespace="http://schemas.microsoft.com/office/2006/metadata/properties" ma:root="true" ma:fieldsID="5fda6c7244f85a62871e6aeadce43f09" ns2:_="" ns3:_="">
     <xsd:import namespace="87a905cf-b897-4a15-b4dd-a8e6e281c28b"/>
@@ -12710,15 +13141,6 @@
 </ct:contentTypeSchema>
 </file>
 
-<file path=customXml/item2.xml><?xml version="1.0" encoding="utf-8"?>
-<?mso-contentType ?>
-<FormTemplates xmlns="http://schemas.microsoft.com/sharepoint/v3/contenttype/forms">
-  <Display>DocumentLibraryForm</Display>
-  <Edit>DocumentLibraryForm</Edit>
-  <New>DocumentLibraryForm</New>
-</FormTemplates>
-</file>
-
 <file path=customXml/item3.xml><?xml version="1.0" encoding="utf-8"?>
 <p:properties xmlns:p="http://schemas.microsoft.com/office/2006/metadata/properties" xmlns:xsi="http://www.w3.org/2001/XMLSchema-instance" xmlns:pc="http://schemas.microsoft.com/office/infopath/2007/PartnerControls">
   <documentManagement>
@@ -12749,6 +13171,14 @@
 </file>
 
 <file path=customXml/itemProps1.xml><?xml version="1.0" encoding="utf-8"?>
+<ds:datastoreItem xmlns:ds="http://schemas.openxmlformats.org/officeDocument/2006/customXml" ds:itemID="{07F4FCAA-B58A-4119-AACD-7D2BC6BC457B}">
+  <ds:schemaRefs>
+    <ds:schemaRef ds:uri="http://schemas.microsoft.com/sharepoint/v3/contenttype/forms"/>
+  </ds:schemaRefs>
+</ds:datastoreItem>
+</file>
+
+<file path=customXml/itemProps2.xml><?xml version="1.0" encoding="utf-8"?>
 <ds:datastoreItem xmlns:ds="http://schemas.openxmlformats.org/officeDocument/2006/customXml" ds:itemID="{70E2D35C-61C5-4F1E-A268-B370BE907187}">
   <ds:schemaRefs>
     <ds:schemaRef ds:uri="http://schemas.microsoft.com/office/2006/metadata/contentType"/>
@@ -12767,14 +13197,6 @@
 </ds:datastoreItem>
 </file>
 
-<file path=customXml/itemProps2.xml><?xml version="1.0" encoding="utf-8"?>
-<ds:datastoreItem xmlns:ds="http://schemas.openxmlformats.org/officeDocument/2006/customXml" ds:itemID="{07F4FCAA-B58A-4119-AACD-7D2BC6BC457B}">
-  <ds:schemaRefs>
-    <ds:schemaRef ds:uri="http://schemas.microsoft.com/sharepoint/v3/contenttype/forms"/>
-  </ds:schemaRefs>
-</ds:datastoreItem>
-</file>
-
 <file path=customXml/itemProps3.xml><?xml version="1.0" encoding="utf-8"?>
 <ds:datastoreItem xmlns:ds="http://schemas.openxmlformats.org/officeDocument/2006/customXml" ds:itemID="{4F26828B-8021-40B0-BE6F-5F8BAA7A8160}">
   <ds:schemaRefs>

</xml_diff>

<commit_message>
Added episode 23 - Mock and Fake added
</commit_message>
<xml_diff>
--- a/Presentations/23- Clean Code - Advanced TDD - Mocking.pptx
+++ b/Presentations/23- Clean Code - Advanced TDD - Mocking.pptx
@@ -5,10 +5,10 @@
     <p:sldMasterId id="2147483648" r:id="rId4"/>
   </p:sldMasterIdLst>
   <p:notesMasterIdLst>
-    <p:notesMasterId r:id="rId17"/>
+    <p:notesMasterId r:id="rId19"/>
   </p:notesMasterIdLst>
   <p:handoutMasterIdLst>
-    <p:handoutMasterId r:id="rId18"/>
+    <p:handoutMasterId r:id="rId20"/>
   </p:handoutMasterIdLst>
   <p:sldIdLst>
     <p:sldId id="449" r:id="rId5"/>
@@ -22,12 +22,14 @@
     <p:sldId id="457" r:id="rId13"/>
     <p:sldId id="458" r:id="rId14"/>
     <p:sldId id="459" r:id="rId15"/>
-    <p:sldId id="422" r:id="rId16"/>
+    <p:sldId id="460" r:id="rId16"/>
+    <p:sldId id="461" r:id="rId17"/>
+    <p:sldId id="422" r:id="rId18"/>
   </p:sldIdLst>
   <p:sldSz cx="12192000" cy="6858000"/>
   <p:notesSz cx="6858000" cy="9144000"/>
   <p:custDataLst>
-    <p:tags r:id="rId19"/>
+    <p:tags r:id="rId21"/>
   </p:custDataLst>
   <p:defaultTextStyle>
     <a:defPPr>
@@ -243,7 +245,7 @@
           <a:p>
             <a:fld id="{D54D4046-5866-459D-BEB5-A0B0377E3E3F}" type="datetime1">
               <a:rPr lang="en-US" sz="1000" smtClean="0"/>
-              <a:t>3/8/23</a:t>
+              <a:t>3/9/23</a:t>
             </a:fld>
             <a:endParaRPr lang="en-US" sz="1000"/>
           </a:p>
@@ -451,6 +453,62 @@
 </inkml:ink>
 </file>
 
+<file path=ppt/ink/ink5.xml><?xml version="1.0" encoding="utf-8"?>
+<inkml:ink xmlns:inkml="http://www.w3.org/2003/InkML">
+  <inkml:definitions>
+    <inkml:context xml:id="ctx0">
+      <inkml:inkSource xml:id="inkSrc0">
+        <inkml:traceFormat>
+          <inkml:channel name="X" type="integer" min="-2.14748E9" max="2.14748E9" units="cm"/>
+          <inkml:channel name="Y" type="integer" min="-2.14748E9" max="2.14748E9" units="cm"/>
+          <inkml:channel name="F" type="integer" max="32767" units="dev"/>
+        </inkml:traceFormat>
+        <inkml:channelProperties>
+          <inkml:channelProperty channel="X" name="resolution" value="1000" units="1/cm"/>
+          <inkml:channelProperty channel="Y" name="resolution" value="1000" units="1/cm"/>
+          <inkml:channelProperty channel="F" name="resolution" value="0" units="1/dev"/>
+        </inkml:channelProperties>
+      </inkml:inkSource>
+      <inkml:timestamp xml:id="ts0" timeString="2023-03-06T07:26:44.477"/>
+    </inkml:context>
+    <inkml:brush xml:id="br0">
+      <inkml:brushProperty name="width" value="0.05" units="cm"/>
+      <inkml:brushProperty name="height" value="0.05" units="cm"/>
+      <inkml:brushProperty name="color" value="#FFC114"/>
+    </inkml:brush>
+  </inkml:definitions>
+  <inkml:trace contextRef="#ctx0" brushRef="#br0">1105 11 24575,'-62'-2'0,"-27"-1"0,31 1 0,-3 1 0,1 0 0,0 1 0,5-1 0,2 1 0,-23 2 0,17 3 0,8 4 0,-1 8 0,-1 7 0,-1 6 0,6 5 0,10 1 0,7 3 0,3 4 0,1 3 0,1 0 0,4-3 0,5-3 0,6-4 0,4-4 0,2-2 0,3-2 0,2 0 0,4 3 0,5 4 0,6 3 0,6 2 0,4-1 0,6 0 0,6 0 0,8 0 0,12-2 0,11-2 0,10-2 0,0-6 0,-2-4 0,-3-3 0,4-3 0,5-2 0,1-2 0,-3-2 0,-14-2 0,-13-2 0,-12-1 0,3 0 0,10 1 0,19 2 0,18 2 0,1-1 0,-12-1 0,-21-4 0,-21-1 0,-10-1 0,-3-1 0,6 0 0,9 1 0,10 0 0,7-1 0,8 2 0,2-1 0,2 0 0,3 1 0,4-2 0,11 0 0,12-1 0,-45-1 0,2 0 0,0 0 0,-1 0 0,-1 0 0,-1 0 0,42 0 0,-16 0 0,-10-1 0,-10-1 0,-9-3 0,-8 0 0,-5-1 0,-3 1 0,2-1 0,-1-2 0,-2-3 0,1-5 0,-2-2 0,3-5 0,-1 1 0,-4 0 0,-6-1 0,-4-3 0,0-8 0,1-8 0,-1-5 0,-3 0 0,-4 1 0,-5 2 0,0 3 0,-2 0 0,0 3 0,-1-2 0,-1 3 0,-1 0 0,-2 2 0,-2 2 0,-1 3 0,-2 4 0,-2 0 0,-5 0 0,-5-2 0,-4 0 0,-1 2 0,1 3 0,2 4 0,1 5 0,-2 1 0,-7 1 0,-8-1 0,-7 2 0,-3 1 0,4 3 0,0 2 0,1 1 0,-3-1 0,-5 0 0,-2 0 0,4 0 0,8 1 0,3 1 0,-3 0 0,-8 0 0,-6 0 0,3 0 0,8 0 0,6 1 0,-1 0 0,-8 0 0,-10 0 0,-4 0 0,0-1 0,5 0 0,11-1 0,6 1 0,6 0 0,3 1 0,1 1 0,-5-1 0,-3 0 0,0 1 0,0 1 0,1 0 0,-8 1 0,-6-1 0,2-1 0,6 0 0,5-2 0,2 0 0,-2 0 0,-5 0 0,4 1 0,6 0 0,0 0 0,1 1 0,-5-1 0,-4 1 0,-2-1 0,2 0 0,2 1 0,5-1 0,7 1 0,4 0 0,-3 1 0,-3-1 0,-3 0 0,0 0 0,6 0 0,3 1 0,1 0 0,2 0 0,0 0 0,1-1 0,2 0 0,1-1 0,0 1 0,3 1 0,0 0 0,2 0 0,0 0 0,2 0 0,2-1 0,1 0 0,0 0 0</inkml:trace>
+</inkml:ink>
+</file>
+
+<file path=ppt/ink/ink6.xml><?xml version="1.0" encoding="utf-8"?>
+<inkml:ink xmlns:inkml="http://www.w3.org/2003/InkML">
+  <inkml:definitions>
+    <inkml:context xml:id="ctx0">
+      <inkml:inkSource xml:id="inkSrc0">
+        <inkml:traceFormat>
+          <inkml:channel name="X" type="integer" min="-2.14748E9" max="2.14748E9" units="cm"/>
+          <inkml:channel name="Y" type="integer" min="-2.14748E9" max="2.14748E9" units="cm"/>
+          <inkml:channel name="F" type="integer" max="32767" units="dev"/>
+        </inkml:traceFormat>
+        <inkml:channelProperties>
+          <inkml:channelProperty channel="X" name="resolution" value="1000" units="1/cm"/>
+          <inkml:channelProperty channel="Y" name="resolution" value="1000" units="1/cm"/>
+          <inkml:channelProperty channel="F" name="resolution" value="0" units="1/dev"/>
+        </inkml:channelProperties>
+      </inkml:inkSource>
+      <inkml:timestamp xml:id="ts0" timeString="2023-03-06T07:26:44.477"/>
+    </inkml:context>
+    <inkml:brush xml:id="br0">
+      <inkml:brushProperty name="width" value="0.05" units="cm"/>
+      <inkml:brushProperty name="height" value="0.05" units="cm"/>
+      <inkml:brushProperty name="color" value="#FFC114"/>
+    </inkml:brush>
+  </inkml:definitions>
+  <inkml:trace contextRef="#ctx0" brushRef="#br0">1105 11 24575,'-62'-2'0,"-27"-1"0,31 1 0,-3 1 0,1 0 0,0 1 0,5-1 0,2 1 0,-23 2 0,17 3 0,8 4 0,-1 8 0,-1 7 0,-1 6 0,6 5 0,10 1 0,7 3 0,3 4 0,1 3 0,1 0 0,4-3 0,5-3 0,6-4 0,4-4 0,2-2 0,3-2 0,2 0 0,4 3 0,5 4 0,6 3 0,6 2 0,4-1 0,6 0 0,6 0 0,8 0 0,12-2 0,11-2 0,10-2 0,0-6 0,-2-4 0,-3-3 0,4-3 0,5-2 0,1-2 0,-3-2 0,-14-2 0,-13-2 0,-12-1 0,3 0 0,10 1 0,19 2 0,18 2 0,1-1 0,-12-1 0,-21-4 0,-21-1 0,-10-1 0,-3-1 0,6 0 0,9 1 0,10 0 0,7-1 0,8 2 0,2-1 0,2 0 0,3 1 0,4-2 0,11 0 0,12-1 0,-45-1 0,2 0 0,0 0 0,-1 0 0,-1 0 0,-1 0 0,42 0 0,-16 0 0,-10-1 0,-10-1 0,-9-3 0,-8 0 0,-5-1 0,-3 1 0,2-1 0,-1-2 0,-2-3 0,1-5 0,-2-2 0,3-5 0,-1 1 0,-4 0 0,-6-1 0,-4-3 0,0-8 0,1-8 0,-1-5 0,-3 0 0,-4 1 0,-5 2 0,0 3 0,-2 0 0,0 3 0,-1-2 0,-1 3 0,-1 0 0,-2 2 0,-2 2 0,-1 3 0,-2 4 0,-2 0 0,-5 0 0,-5-2 0,-4 0 0,-1 2 0,1 3 0,2 4 0,1 5 0,-2 1 0,-7 1 0,-8-1 0,-7 2 0,-3 1 0,4 3 0,0 2 0,1 1 0,-3-1 0,-5 0 0,-2 0 0,4 0 0,8 1 0,3 1 0,-3 0 0,-8 0 0,-6 0 0,3 0 0,8 0 0,6 1 0,-1 0 0,-8 0 0,-10 0 0,-4 0 0,0-1 0,5 0 0,11-1 0,6 1 0,6 0 0,3 1 0,1 1 0,-5-1 0,-3 0 0,0 1 0,0 1 0,1 0 0,-8 1 0,-6-1 0,2-1 0,6 0 0,5-2 0,2 0 0,-2 0 0,-5 0 0,4 1 0,6 0 0,0 0 0,1 1 0,-5-1 0,-4 1 0,-2-1 0,2 0 0,2 1 0,5-1 0,7 1 0,4 0 0,-3 1 0,-3-1 0,-3 0 0,0 0 0,6 0 0,3 1 0,1 0 0,2 0 0,0 0 0,1-1 0,2 0 0,1-1 0,0 1 0,3 1 0,0 0 0,2 0 0,0 0 0,2 0 0,2-1 0,1 0 0,0 0 0</inkml:trace>
+</inkml:ink>
+</file>
+
 <file path=ppt/notesMasters/notesMaster1.xml><?xml version="1.0" encoding="utf-8"?>
 <p:notesMaster xmlns:a="http://schemas.openxmlformats.org/drawingml/2006/main" xmlns:r="http://schemas.openxmlformats.org/officeDocument/2006/relationships" xmlns:p="http://schemas.openxmlformats.org/presentationml/2006/main">
   <p:cSld>
@@ -504,7 +562,7 @@
           <a:p>
             <a:fld id="{86CA08A8-CD0A-4CED-A7DF-8FE5DAE0B145}" type="datetime1">
               <a:rPr lang="en-US" smtClean="0"/>
-              <a:t>3/8/23</a:t>
+              <a:t>3/9/23</a:t>
             </a:fld>
             <a:endParaRPr lang="en-US" dirty="0"/>
           </a:p>
@@ -870,7 +928,7 @@
           <a:p>
             <a:fld id="{3CB1730B-F0FD-4857-ADC5-05FFCBB96A2D}" type="datetime1">
               <a:rPr lang="en-US" smtClean="0"/>
-              <a:t>3/8/23</a:t>
+              <a:t>3/9/23</a:t>
             </a:fld>
             <a:endParaRPr lang="en-US" dirty="0"/>
           </a:p>
@@ -1007,7 +1065,7 @@
           <a:p>
             <a:fld id="{AD73FA9E-13CA-4D34-8989-6ECB15E9C63C}" type="datetime1">
               <a:rPr lang="en-US" smtClean="0"/>
-              <a:t>3/8/23</a:t>
+              <a:t>3/9/23</a:t>
             </a:fld>
             <a:endParaRPr lang="en-US" dirty="0"/>
           </a:p>
@@ -1037,7 +1095,7 @@
             <a:fld id="{78ADB214-F42C-4297-A187-8792AE2D2F13}" type="slidenum">
               <a:rPr lang="en-US" smtClean="0"/>
               <a:pPr/>
-              <a:t>12</a:t>
+              <a:t>14</a:t>
             </a:fld>
             <a:endParaRPr lang="en-US" dirty="0"/>
           </a:p>
@@ -9548,7 +9606,7 @@
                 <a:ea typeface="Times New Roman" panose="02020603050405020304" pitchFamily="18" charset="0"/>
                 <a:cs typeface="Times New Roman" panose="02020603050405020304" pitchFamily="18" charset="0"/>
               </a:rPr>
-              <a:t>The Stub does nothing… but instead of returning null or zero like a Dummy, it will return a value. A value that is consistent with the needs of the test.</a:t>
+              <a:t>The Stub is a Dummy which does nothing… but instead of returning null or zero like a Dummy, it will return a value. A value that is consistent with the needs of the test.</a:t>
             </a:r>
             <a:endParaRPr lang="en-US" sz="2000" dirty="0">
               <a:solidFill>
@@ -9957,8 +10015,8 @@
           </a:prstGeom>
         </p:spPr>
       </p:pic>
-      <mc:AlternateContent xmlns:mc="http://schemas.openxmlformats.org/markup-compatibility/2006">
-        <mc:Choice xmlns:p14="http://schemas.microsoft.com/office/powerpoint/2010/main" Requires="p14">
+      <mc:AlternateContent xmlns:mc="http://schemas.openxmlformats.org/markup-compatibility/2006" xmlns:p14="http://schemas.microsoft.com/office/powerpoint/2010/main">
+        <mc:Choice Requires="p14">
           <p:contentPart p14:bwMode="auto" r:id="rId3">
             <p14:nvContentPartPr>
               <p14:cNvPr id="7" name="Ink 6">
@@ -9977,7 +10035,7 @@
             </p14:xfrm>
           </p:contentPart>
         </mc:Choice>
-        <mc:Fallback>
+        <mc:Fallback xmlns="">
           <p:pic>
             <p:nvPicPr>
               <p:cNvPr id="7" name="Ink 6">
@@ -10209,6 +10267,1693 @@
 </file>
 
 <file path=ppt/slides/slide12.xml><?xml version="1.0" encoding="utf-8"?>
+<p:sld xmlns:a="http://schemas.openxmlformats.org/drawingml/2006/main" xmlns:r="http://schemas.openxmlformats.org/officeDocument/2006/relationships" xmlns:p="http://schemas.openxmlformats.org/presentationml/2006/main">
+  <p:cSld>
+    <p:spTree>
+      <p:nvGrpSpPr>
+        <p:cNvPr id="1" name=""/>
+        <p:cNvGrpSpPr/>
+        <p:nvPr/>
+      </p:nvGrpSpPr>
+      <p:grpSpPr>
+        <a:xfrm>
+          <a:off x="0" y="0"/>
+          <a:ext cx="0" cy="0"/>
+          <a:chOff x="0" y="0"/>
+          <a:chExt cx="0" cy="0"/>
+        </a:xfrm>
+      </p:grpSpPr>
+      <p:sp>
+        <p:nvSpPr>
+          <p:cNvPr id="2" name="Title 1">
+            <a:extLst>
+              <a:ext uri="{FF2B5EF4-FFF2-40B4-BE49-F238E27FC236}">
+                <a16:creationId xmlns:a16="http://schemas.microsoft.com/office/drawing/2014/main" id="{DC85130C-ECCE-82EC-6401-213862135DC2}"/>
+              </a:ext>
+            </a:extLst>
+          </p:cNvPr>
+          <p:cNvSpPr>
+            <a:spLocks noGrp="1"/>
+          </p:cNvSpPr>
+          <p:nvPr>
+            <p:ph type="title"/>
+          </p:nvPr>
+        </p:nvSpPr>
+        <p:spPr/>
+        <p:txBody>
+          <a:bodyPr/>
+          <a:lstStyle/>
+          <a:p>
+            <a:r>
+              <a:rPr lang="en-US" dirty="0"/>
+              <a:t>The true Mock</a:t>
+            </a:r>
+          </a:p>
+        </p:txBody>
+      </p:sp>
+      <p:sp>
+        <p:nvSpPr>
+          <p:cNvPr id="6" name="TextBox 5">
+            <a:extLst>
+              <a:ext uri="{FF2B5EF4-FFF2-40B4-BE49-F238E27FC236}">
+                <a16:creationId xmlns:a16="http://schemas.microsoft.com/office/drawing/2014/main" id="{2D5019FF-F8CC-0A1B-35C6-BB57664D780F}"/>
+              </a:ext>
+            </a:extLst>
+          </p:cNvPr>
+          <p:cNvSpPr txBox="1"/>
+          <p:nvPr/>
+        </p:nvSpPr>
+        <p:spPr>
+          <a:xfrm>
+            <a:off x="3773742" y="1371600"/>
+            <a:ext cx="6426714" cy="1089529"/>
+          </a:xfrm>
+          <a:prstGeom prst="rect">
+            <a:avLst/>
+          </a:prstGeom>
+          <a:solidFill>
+            <a:srgbClr val="FF85FF"/>
+          </a:solidFill>
+          <a:ln>
+            <a:noFill/>
+          </a:ln>
+        </p:spPr>
+        <p:txBody>
+          <a:bodyPr wrap="square" rtlCol="0">
+            <a:spAutoFit/>
+          </a:bodyPr>
+          <a:lstStyle/>
+          <a:p>
+            <a:pPr algn="l">
+              <a:lnSpc>
+                <a:spcPct val="90000"/>
+              </a:lnSpc>
+              <a:spcBef>
+                <a:spcPts val="1200"/>
+              </a:spcBef>
+            </a:pPr>
+            <a:r>
+              <a:rPr lang="en-US" dirty="0">
+                <a:solidFill>
+                  <a:srgbClr val="C00000"/>
+                </a:solidFill>
+              </a:rPr>
+              <a:t>The true Mock is a Spy (it’s functions do nothing, but it returns values that are useful to the test, and remembers interesting facts about the way it was called). But the true Mock’s special feature is that </a:t>
+            </a:r>
+            <a:r>
+              <a:rPr lang="en-US" dirty="0">
+                <a:solidFill>
+                  <a:srgbClr val="C00000"/>
+                </a:solidFill>
+                <a:highlight>
+                  <a:srgbClr val="FFFF00"/>
+                </a:highlight>
+              </a:rPr>
+              <a:t>it knows what should happen</a:t>
+            </a:r>
+          </a:p>
+        </p:txBody>
+      </p:sp>
+      <p:pic>
+        <p:nvPicPr>
+          <p:cNvPr id="3" name="Picture 2">
+            <a:extLst>
+              <a:ext uri="{FF2B5EF4-FFF2-40B4-BE49-F238E27FC236}">
+                <a16:creationId xmlns:a16="http://schemas.microsoft.com/office/drawing/2014/main" id="{61D364B3-1485-B4D9-5121-607453FC680E}"/>
+              </a:ext>
+            </a:extLst>
+          </p:cNvPr>
+          <p:cNvPicPr>
+            <a:picLocks noChangeAspect="1"/>
+          </p:cNvPicPr>
+          <p:nvPr/>
+        </p:nvPicPr>
+        <p:blipFill>
+          <a:blip r:embed="rId2">
+            <a:extLst>
+              <a:ext uri="{28A0092B-C50C-407E-A947-70E740481C1C}">
+                <a14:useLocalDpi xmlns:a14="http://schemas.microsoft.com/office/drawing/2010/main" val="0"/>
+              </a:ext>
+            </a:extLst>
+          </a:blip>
+          <a:stretch>
+            <a:fillRect/>
+          </a:stretch>
+        </p:blipFill>
+        <p:spPr>
+          <a:xfrm>
+            <a:off x="335280" y="1457549"/>
+            <a:ext cx="2984145" cy="2691531"/>
+          </a:xfrm>
+          <a:prstGeom prst="rect">
+            <a:avLst/>
+          </a:prstGeom>
+        </p:spPr>
+      </p:pic>
+      <mc:AlternateContent xmlns:mc="http://schemas.openxmlformats.org/markup-compatibility/2006">
+        <mc:Choice xmlns:p14="http://schemas.microsoft.com/office/powerpoint/2010/main" Requires="p14">
+          <p:contentPart p14:bwMode="auto" r:id="rId3">
+            <p14:nvContentPartPr>
+              <p14:cNvPr id="7" name="Ink 6">
+                <a:extLst>
+                  <a:ext uri="{FF2B5EF4-FFF2-40B4-BE49-F238E27FC236}">
+                    <a16:creationId xmlns:a16="http://schemas.microsoft.com/office/drawing/2014/main" id="{520EF2AC-EB13-853A-7CAE-59A82596DF0C}"/>
+                  </a:ext>
+                </a:extLst>
+              </p14:cNvPr>
+              <p14:cNvContentPartPr/>
+              <p14:nvPr/>
+            </p14:nvContentPartPr>
+            <p14:xfrm>
+              <a:off x="1035264" y="3710600"/>
+              <a:ext cx="1308600" cy="438480"/>
+            </p14:xfrm>
+          </p:contentPart>
+        </mc:Choice>
+        <mc:Fallback>
+          <p:pic>
+            <p:nvPicPr>
+              <p:cNvPr id="7" name="Ink 6">
+                <a:extLst>
+                  <a:ext uri="{FF2B5EF4-FFF2-40B4-BE49-F238E27FC236}">
+                    <a16:creationId xmlns:a16="http://schemas.microsoft.com/office/drawing/2014/main" id="{520EF2AC-EB13-853A-7CAE-59A82596DF0C}"/>
+                  </a:ext>
+                </a:extLst>
+              </p:cNvPr>
+              <p:cNvPicPr/>
+              <p:nvPr/>
+            </p:nvPicPr>
+            <p:blipFill>
+              <a:blip r:embed="rId4"/>
+              <a:stretch>
+                <a:fillRect/>
+              </a:stretch>
+            </p:blipFill>
+            <p:spPr>
+              <a:xfrm>
+                <a:off x="1026264" y="3701600"/>
+                <a:ext cx="1326240" cy="456120"/>
+              </a:xfrm>
+              <a:prstGeom prst="rect">
+                <a:avLst/>
+              </a:prstGeom>
+            </p:spPr>
+          </p:pic>
+        </mc:Fallback>
+      </mc:AlternateContent>
+      <p:sp>
+        <p:nvSpPr>
+          <p:cNvPr id="10" name="TextBox 9">
+            <a:extLst>
+              <a:ext uri="{FF2B5EF4-FFF2-40B4-BE49-F238E27FC236}">
+                <a16:creationId xmlns:a16="http://schemas.microsoft.com/office/drawing/2014/main" id="{247969F1-7C9B-6F6E-622F-3EF2AE4C9E0C}"/>
+              </a:ext>
+            </a:extLst>
+          </p:cNvPr>
+          <p:cNvSpPr txBox="1"/>
+          <p:nvPr/>
+        </p:nvSpPr>
+        <p:spPr>
+          <a:xfrm>
+            <a:off x="1035264" y="5058819"/>
+            <a:ext cx="1584176" cy="341632"/>
+          </a:xfrm>
+          <a:prstGeom prst="rect">
+            <a:avLst/>
+          </a:prstGeom>
+          <a:noFill/>
+          <a:ln>
+            <a:noFill/>
+          </a:ln>
+        </p:spPr>
+        <p:txBody>
+          <a:bodyPr wrap="square" rtlCol="0">
+            <a:spAutoFit/>
+          </a:bodyPr>
+          <a:lstStyle/>
+          <a:p>
+            <a:pPr algn="l">
+              <a:lnSpc>
+                <a:spcPct val="90000"/>
+              </a:lnSpc>
+              <a:spcBef>
+                <a:spcPts val="1200"/>
+              </a:spcBef>
+            </a:pPr>
+            <a:r>
+              <a:rPr lang="en-GB" sz="1800" dirty="0">
+                <a:effectLst/>
+                <a:latin typeface="Calibri" panose="020F0502020204030204" pitchFamily="34" charset="0"/>
+                <a:ea typeface="Times New Roman" panose="02020603050405020304" pitchFamily="18" charset="0"/>
+                <a:cs typeface="Times New Roman" panose="02020603050405020304" pitchFamily="18" charset="0"/>
+              </a:rPr>
+              <a:t>See the code</a:t>
+            </a:r>
+            <a:endParaRPr lang="en-US" sz="2000" dirty="0">
+              <a:solidFill>
+                <a:srgbClr val="FFD579"/>
+              </a:solidFill>
+            </a:endParaRPr>
+          </a:p>
+        </p:txBody>
+      </p:sp>
+      <p:sp>
+        <p:nvSpPr>
+          <p:cNvPr id="8" name="TextBox 7">
+            <a:extLst>
+              <a:ext uri="{FF2B5EF4-FFF2-40B4-BE49-F238E27FC236}">
+                <a16:creationId xmlns:a16="http://schemas.microsoft.com/office/drawing/2014/main" id="{29B7CF77-3BA0-006F-E464-C1B9C71FCB7F}"/>
+              </a:ext>
+            </a:extLst>
+          </p:cNvPr>
+          <p:cNvSpPr txBox="1"/>
+          <p:nvPr/>
+        </p:nvSpPr>
+        <p:spPr>
+          <a:xfrm>
+            <a:off x="4583832" y="2803314"/>
+            <a:ext cx="3538010" cy="840230"/>
+          </a:xfrm>
+          <a:prstGeom prst="rect">
+            <a:avLst/>
+          </a:prstGeom>
+          <a:solidFill>
+            <a:schemeClr val="accent6"/>
+          </a:solidFill>
+          <a:ln>
+            <a:noFill/>
+          </a:ln>
+        </p:spPr>
+        <p:txBody>
+          <a:bodyPr wrap="square" rtlCol="0">
+            <a:spAutoFit/>
+          </a:bodyPr>
+          <a:lstStyle/>
+          <a:p>
+            <a:pPr algn="l">
+              <a:lnSpc>
+                <a:spcPct val="90000"/>
+              </a:lnSpc>
+              <a:spcBef>
+                <a:spcPts val="1200"/>
+              </a:spcBef>
+            </a:pPr>
+            <a:r>
+              <a:rPr lang="en-GB" sz="1800" dirty="0">
+                <a:solidFill>
+                  <a:schemeClr val="accent1">
+                    <a:lumMod val="60000"/>
+                    <a:lumOff val="40000"/>
+                  </a:schemeClr>
+                </a:solidFill>
+                <a:effectLst/>
+                <a:latin typeface="Calibri" panose="020F0502020204030204" pitchFamily="34" charset="0"/>
+                <a:ea typeface="Times New Roman" panose="02020603050405020304" pitchFamily="18" charset="0"/>
+                <a:cs typeface="Times New Roman" panose="02020603050405020304" pitchFamily="18" charset="0"/>
+              </a:rPr>
+              <a:t>The test asks the true Mock if everything went the way it was supposed to.  </a:t>
+            </a:r>
+            <a:endParaRPr lang="en-US" sz="2000" dirty="0">
+              <a:solidFill>
+                <a:schemeClr val="accent1">
+                  <a:lumMod val="60000"/>
+                  <a:lumOff val="40000"/>
+                </a:schemeClr>
+              </a:solidFill>
+            </a:endParaRPr>
+          </a:p>
+        </p:txBody>
+      </p:sp>
+      <p:sp>
+        <p:nvSpPr>
+          <p:cNvPr id="4" name="TextBox 3">
+            <a:extLst>
+              <a:ext uri="{FF2B5EF4-FFF2-40B4-BE49-F238E27FC236}">
+                <a16:creationId xmlns:a16="http://schemas.microsoft.com/office/drawing/2014/main" id="{3DEC9A86-FA87-E349-96FF-22174018F19D}"/>
+              </a:ext>
+            </a:extLst>
+          </p:cNvPr>
+          <p:cNvSpPr txBox="1"/>
+          <p:nvPr/>
+        </p:nvSpPr>
+        <p:spPr>
+          <a:xfrm>
+            <a:off x="6701393" y="3900907"/>
+            <a:ext cx="3538010" cy="341632"/>
+          </a:xfrm>
+          <a:prstGeom prst="rect">
+            <a:avLst/>
+          </a:prstGeom>
+          <a:solidFill>
+            <a:srgbClr val="0070C0"/>
+          </a:solidFill>
+          <a:ln>
+            <a:noFill/>
+          </a:ln>
+        </p:spPr>
+        <p:txBody>
+          <a:bodyPr wrap="square" rtlCol="0">
+            <a:spAutoFit/>
+          </a:bodyPr>
+          <a:lstStyle/>
+          <a:p>
+            <a:pPr algn="l">
+              <a:lnSpc>
+                <a:spcPct val="90000"/>
+              </a:lnSpc>
+              <a:spcBef>
+                <a:spcPts val="1200"/>
+              </a:spcBef>
+            </a:pPr>
+            <a:r>
+              <a:rPr lang="en-GB" sz="1800" dirty="0">
+                <a:solidFill>
+                  <a:srgbClr val="FF85FF"/>
+                </a:solidFill>
+                <a:effectLst/>
+                <a:latin typeface="Calibri" panose="020F0502020204030204" pitchFamily="34" charset="0"/>
+                <a:ea typeface="Times New Roman" panose="02020603050405020304" pitchFamily="18" charset="0"/>
+                <a:cs typeface="Times New Roman" panose="02020603050405020304" pitchFamily="18" charset="0"/>
+              </a:rPr>
+              <a:t>The test trusts the true Mock. </a:t>
+            </a:r>
+            <a:endParaRPr lang="en-US" sz="2000" dirty="0">
+              <a:solidFill>
+                <a:srgbClr val="FF85FF"/>
+              </a:solidFill>
+            </a:endParaRPr>
+          </a:p>
+        </p:txBody>
+      </p:sp>
+      <p:sp>
+        <p:nvSpPr>
+          <p:cNvPr id="5" name="TextBox 4">
+            <a:extLst>
+              <a:ext uri="{FF2B5EF4-FFF2-40B4-BE49-F238E27FC236}">
+                <a16:creationId xmlns:a16="http://schemas.microsoft.com/office/drawing/2014/main" id="{E840E896-0AC8-5739-2898-5B35AEAD669A}"/>
+              </a:ext>
+            </a:extLst>
+          </p:cNvPr>
+          <p:cNvSpPr txBox="1"/>
+          <p:nvPr/>
+        </p:nvSpPr>
+        <p:spPr>
+          <a:xfrm>
+            <a:off x="839416" y="5656906"/>
+            <a:ext cx="9195146" cy="313932"/>
+          </a:xfrm>
+          <a:prstGeom prst="rect">
+            <a:avLst/>
+          </a:prstGeom>
+          <a:noFill/>
+          <a:ln>
+            <a:solidFill>
+              <a:srgbClr val="FF0000"/>
+            </a:solidFill>
+          </a:ln>
+        </p:spPr>
+        <p:txBody>
+          <a:bodyPr wrap="none" rtlCol="0">
+            <a:spAutoFit/>
+          </a:bodyPr>
+          <a:lstStyle/>
+          <a:p>
+            <a:pPr>
+              <a:lnSpc>
+                <a:spcPct val="90000"/>
+              </a:lnSpc>
+              <a:spcBef>
+                <a:spcPts val="1200"/>
+              </a:spcBef>
+            </a:pPr>
+            <a:r>
+              <a:rPr lang="en-GB" sz="1600" i="1" dirty="0" err="1">
+                <a:solidFill>
+                  <a:srgbClr val="CB4B16"/>
+                </a:solidFill>
+                <a:effectLst/>
+                <a:latin typeface="Menlo" panose="020B0609030804020204" pitchFamily="49" charset="0"/>
+              </a:rPr>
+              <a:t>assertThat</a:t>
+            </a:r>
+            <a:r>
+              <a:rPr lang="en-GB" sz="1600" dirty="0">
+                <a:solidFill>
+                  <a:srgbClr val="586E75"/>
+                </a:solidFill>
+                <a:effectLst/>
+                <a:latin typeface="Menlo" panose="020B0609030804020204" pitchFamily="49" charset="0"/>
+              </a:rPr>
+              <a:t>(</a:t>
+            </a:r>
+            <a:r>
+              <a:rPr lang="en-GB" sz="1600" dirty="0" err="1">
+                <a:solidFill>
+                  <a:srgbClr val="859900"/>
+                </a:solidFill>
+                <a:effectLst/>
+                <a:latin typeface="Menlo" panose="020B0609030804020204" pitchFamily="49" charset="0"/>
+              </a:rPr>
+              <a:t>authorizerMock</a:t>
+            </a:r>
+            <a:r>
+              <a:rPr lang="en-GB" sz="1600" dirty="0" err="1">
+                <a:solidFill>
+                  <a:srgbClr val="586E75"/>
+                </a:solidFill>
+                <a:effectLst/>
+                <a:latin typeface="Menlo" panose="020B0609030804020204" pitchFamily="49" charset="0"/>
+              </a:rPr>
+              <a:t>.</a:t>
+            </a:r>
+            <a:r>
+              <a:rPr lang="en-GB" sz="1600" dirty="0" err="1">
+                <a:solidFill>
+                  <a:srgbClr val="859900"/>
+                </a:solidFill>
+                <a:effectLst/>
+                <a:latin typeface="Menlo" panose="020B0609030804020204" pitchFamily="49" charset="0"/>
+              </a:rPr>
+              <a:t>verifyHeldOnThirdAttempt</a:t>
+            </a:r>
+            <a:r>
+              <a:rPr lang="en-GB" sz="1600" dirty="0">
+                <a:solidFill>
+                  <a:srgbClr val="0E4A8E"/>
+                </a:solidFill>
+                <a:effectLst/>
+                <a:latin typeface="Menlo" panose="020B0609030804020204" pitchFamily="49" charset="0"/>
+              </a:rPr>
+              <a:t>(</a:t>
+            </a:r>
+            <a:r>
+              <a:rPr lang="en-GB" sz="1600" dirty="0">
+                <a:solidFill>
+                  <a:srgbClr val="DC322F"/>
+                </a:solidFill>
+                <a:effectLst/>
+                <a:latin typeface="Menlo" panose="020B0609030804020204" pitchFamily="49" charset="0"/>
+              </a:rPr>
+              <a:t>"username"</a:t>
+            </a:r>
+            <a:r>
+              <a:rPr lang="en-GB" sz="1600" dirty="0">
+                <a:solidFill>
+                  <a:srgbClr val="0E4A8E"/>
+                </a:solidFill>
+                <a:effectLst/>
+                <a:latin typeface="Menlo" panose="020B0609030804020204" pitchFamily="49" charset="0"/>
+              </a:rPr>
+              <a:t>)</a:t>
+            </a:r>
+            <a:r>
+              <a:rPr lang="en-GB" sz="1600" dirty="0">
+                <a:solidFill>
+                  <a:srgbClr val="586E75"/>
+                </a:solidFill>
+                <a:effectLst/>
+                <a:latin typeface="Menlo" panose="020B0609030804020204" pitchFamily="49" charset="0"/>
+              </a:rPr>
+              <a:t>).</a:t>
+            </a:r>
+            <a:r>
+              <a:rPr lang="en-GB" sz="1600" dirty="0" err="1">
+                <a:solidFill>
+                  <a:srgbClr val="859900"/>
+                </a:solidFill>
+                <a:effectLst/>
+                <a:latin typeface="Menlo" panose="020B0609030804020204" pitchFamily="49" charset="0"/>
+              </a:rPr>
+              <a:t>isTrue</a:t>
+            </a:r>
+            <a:r>
+              <a:rPr lang="en-GB" sz="1600" dirty="0">
+                <a:solidFill>
+                  <a:srgbClr val="586E75"/>
+                </a:solidFill>
+                <a:effectLst/>
+                <a:latin typeface="Menlo" panose="020B0609030804020204" pitchFamily="49" charset="0"/>
+              </a:rPr>
+              <a:t>();</a:t>
+            </a:r>
+          </a:p>
+        </p:txBody>
+      </p:sp>
+    </p:spTree>
+    <p:extLst>
+      <p:ext uri="{BB962C8B-B14F-4D97-AF65-F5344CB8AC3E}">
+        <p14:creationId xmlns:p14="http://schemas.microsoft.com/office/powerpoint/2010/main" val="3175384594"/>
+      </p:ext>
+    </p:extLst>
+  </p:cSld>
+  <p:clrMapOvr>
+    <a:masterClrMapping/>
+  </p:clrMapOvr>
+  <p:transition>
+    <p:fade/>
+  </p:transition>
+</p:sld>
+</file>
+
+<file path=ppt/slides/slide13.xml><?xml version="1.0" encoding="utf-8"?>
+<p:sld xmlns:a="http://schemas.openxmlformats.org/drawingml/2006/main" xmlns:r="http://schemas.openxmlformats.org/officeDocument/2006/relationships" xmlns:p="http://schemas.openxmlformats.org/presentationml/2006/main">
+  <p:cSld>
+    <p:spTree>
+      <p:nvGrpSpPr>
+        <p:cNvPr id="1" name=""/>
+        <p:cNvGrpSpPr/>
+        <p:nvPr/>
+      </p:nvGrpSpPr>
+      <p:grpSpPr>
+        <a:xfrm>
+          <a:off x="0" y="0"/>
+          <a:ext cx="0" cy="0"/>
+          <a:chOff x="0" y="0"/>
+          <a:chExt cx="0" cy="0"/>
+        </a:xfrm>
+      </p:grpSpPr>
+      <p:sp>
+        <p:nvSpPr>
+          <p:cNvPr id="2" name="Title 1">
+            <a:extLst>
+              <a:ext uri="{FF2B5EF4-FFF2-40B4-BE49-F238E27FC236}">
+                <a16:creationId xmlns:a16="http://schemas.microsoft.com/office/drawing/2014/main" id="{DC85130C-ECCE-82EC-6401-213862135DC2}"/>
+              </a:ext>
+            </a:extLst>
+          </p:cNvPr>
+          <p:cNvSpPr>
+            <a:spLocks noGrp="1"/>
+          </p:cNvSpPr>
+          <p:nvPr>
+            <p:ph type="title"/>
+          </p:nvPr>
+        </p:nvSpPr>
+        <p:spPr/>
+        <p:txBody>
+          <a:bodyPr/>
+          <a:lstStyle/>
+          <a:p>
+            <a:r>
+              <a:rPr lang="en-US" dirty="0"/>
+              <a:t>The Fake</a:t>
+            </a:r>
+          </a:p>
+        </p:txBody>
+      </p:sp>
+      <p:sp>
+        <p:nvSpPr>
+          <p:cNvPr id="6" name="TextBox 5">
+            <a:extLst>
+              <a:ext uri="{FF2B5EF4-FFF2-40B4-BE49-F238E27FC236}">
+                <a16:creationId xmlns:a16="http://schemas.microsoft.com/office/drawing/2014/main" id="{2D5019FF-F8CC-0A1B-35C6-BB57664D780F}"/>
+              </a:ext>
+            </a:extLst>
+          </p:cNvPr>
+          <p:cNvSpPr txBox="1"/>
+          <p:nvPr/>
+        </p:nvSpPr>
+        <p:spPr>
+          <a:xfrm>
+            <a:off x="3575720" y="1116995"/>
+            <a:ext cx="6426714" cy="840230"/>
+          </a:xfrm>
+          <a:prstGeom prst="rect">
+            <a:avLst/>
+          </a:prstGeom>
+          <a:solidFill>
+            <a:schemeClr val="accent4">
+              <a:lumMod val="20000"/>
+              <a:lumOff val="80000"/>
+            </a:schemeClr>
+          </a:solidFill>
+          <a:ln>
+            <a:noFill/>
+          </a:ln>
+        </p:spPr>
+        <p:txBody>
+          <a:bodyPr wrap="square" rtlCol="0">
+            <a:spAutoFit/>
+          </a:bodyPr>
+          <a:lstStyle/>
+          <a:p>
+            <a:pPr algn="l">
+              <a:lnSpc>
+                <a:spcPct val="90000"/>
+              </a:lnSpc>
+              <a:spcBef>
+                <a:spcPts val="1200"/>
+              </a:spcBef>
+            </a:pPr>
+            <a:r>
+              <a:rPr lang="en-US" dirty="0">
+                <a:solidFill>
+                  <a:schemeClr val="tx2">
+                    <a:lumMod val="50000"/>
+                    <a:lumOff val="50000"/>
+                  </a:schemeClr>
+                </a:solidFill>
+              </a:rPr>
+              <a:t>The Fakes are simulators. In the days before TDD and you had an external service you would often replace that service with a simulator that acted like that service.</a:t>
+            </a:r>
+            <a:endParaRPr lang="en-US" dirty="0">
+              <a:solidFill>
+                <a:schemeClr val="tx2">
+                  <a:lumMod val="50000"/>
+                  <a:lumOff val="50000"/>
+                </a:schemeClr>
+              </a:solidFill>
+              <a:highlight>
+                <a:srgbClr val="FFFF00"/>
+              </a:highlight>
+            </a:endParaRPr>
+          </a:p>
+        </p:txBody>
+      </p:sp>
+      <p:pic>
+        <p:nvPicPr>
+          <p:cNvPr id="3" name="Picture 2">
+            <a:extLst>
+              <a:ext uri="{FF2B5EF4-FFF2-40B4-BE49-F238E27FC236}">
+                <a16:creationId xmlns:a16="http://schemas.microsoft.com/office/drawing/2014/main" id="{61D364B3-1485-B4D9-5121-607453FC680E}"/>
+              </a:ext>
+            </a:extLst>
+          </p:cNvPr>
+          <p:cNvPicPr>
+            <a:picLocks noChangeAspect="1"/>
+          </p:cNvPicPr>
+          <p:nvPr/>
+        </p:nvPicPr>
+        <p:blipFill>
+          <a:blip r:embed="rId2">
+            <a:extLst>
+              <a:ext uri="{28A0092B-C50C-407E-A947-70E740481C1C}">
+                <a14:useLocalDpi xmlns:a14="http://schemas.microsoft.com/office/drawing/2010/main" val="0"/>
+              </a:ext>
+            </a:extLst>
+          </a:blip>
+          <a:stretch>
+            <a:fillRect/>
+          </a:stretch>
+        </p:blipFill>
+        <p:spPr>
+          <a:xfrm>
+            <a:off x="335280" y="1457549"/>
+            <a:ext cx="2984145" cy="2691531"/>
+          </a:xfrm>
+          <a:prstGeom prst="rect">
+            <a:avLst/>
+          </a:prstGeom>
+        </p:spPr>
+      </p:pic>
+      <mc:AlternateContent xmlns:mc="http://schemas.openxmlformats.org/markup-compatibility/2006">
+        <mc:Choice xmlns:p14="http://schemas.microsoft.com/office/powerpoint/2010/main" Requires="p14">
+          <p:contentPart p14:bwMode="auto" r:id="rId3">
+            <p14:nvContentPartPr>
+              <p14:cNvPr id="7" name="Ink 6">
+                <a:extLst>
+                  <a:ext uri="{FF2B5EF4-FFF2-40B4-BE49-F238E27FC236}">
+                    <a16:creationId xmlns:a16="http://schemas.microsoft.com/office/drawing/2014/main" id="{520EF2AC-EB13-853A-7CAE-59A82596DF0C}"/>
+                  </a:ext>
+                </a:extLst>
+              </p14:cNvPr>
+              <p14:cNvContentPartPr/>
+              <p14:nvPr/>
+            </p14:nvContentPartPr>
+            <p14:xfrm>
+              <a:off x="2351584" y="2696926"/>
+              <a:ext cx="1308600" cy="438480"/>
+            </p14:xfrm>
+          </p:contentPart>
+        </mc:Choice>
+        <mc:Fallback>
+          <p:pic>
+            <p:nvPicPr>
+              <p:cNvPr id="7" name="Ink 6">
+                <a:extLst>
+                  <a:ext uri="{FF2B5EF4-FFF2-40B4-BE49-F238E27FC236}">
+                    <a16:creationId xmlns:a16="http://schemas.microsoft.com/office/drawing/2014/main" id="{520EF2AC-EB13-853A-7CAE-59A82596DF0C}"/>
+                  </a:ext>
+                </a:extLst>
+              </p:cNvPr>
+              <p:cNvPicPr/>
+              <p:nvPr/>
+            </p:nvPicPr>
+            <p:blipFill>
+              <a:blip r:embed="rId4"/>
+              <a:stretch>
+                <a:fillRect/>
+              </a:stretch>
+            </p:blipFill>
+            <p:spPr>
+              <a:xfrm>
+                <a:off x="2342584" y="2687926"/>
+                <a:ext cx="1326240" cy="456120"/>
+              </a:xfrm>
+              <a:prstGeom prst="rect">
+                <a:avLst/>
+              </a:prstGeom>
+            </p:spPr>
+          </p:pic>
+        </mc:Fallback>
+      </mc:AlternateContent>
+      <p:sp>
+        <p:nvSpPr>
+          <p:cNvPr id="10" name="TextBox 9">
+            <a:extLst>
+              <a:ext uri="{FF2B5EF4-FFF2-40B4-BE49-F238E27FC236}">
+                <a16:creationId xmlns:a16="http://schemas.microsoft.com/office/drawing/2014/main" id="{247969F1-7C9B-6F6E-622F-3EF2AE4C9E0C}"/>
+              </a:ext>
+            </a:extLst>
+          </p:cNvPr>
+          <p:cNvSpPr txBox="1"/>
+          <p:nvPr/>
+        </p:nvSpPr>
+        <p:spPr>
+          <a:xfrm>
+            <a:off x="1035264" y="5058819"/>
+            <a:ext cx="1584176" cy="341632"/>
+          </a:xfrm>
+          <a:prstGeom prst="rect">
+            <a:avLst/>
+          </a:prstGeom>
+          <a:noFill/>
+          <a:ln>
+            <a:noFill/>
+          </a:ln>
+        </p:spPr>
+        <p:txBody>
+          <a:bodyPr wrap="square" rtlCol="0">
+            <a:spAutoFit/>
+          </a:bodyPr>
+          <a:lstStyle/>
+          <a:p>
+            <a:pPr algn="l">
+              <a:lnSpc>
+                <a:spcPct val="90000"/>
+              </a:lnSpc>
+              <a:spcBef>
+                <a:spcPts val="1200"/>
+              </a:spcBef>
+            </a:pPr>
+            <a:r>
+              <a:rPr lang="en-GB" sz="1800" dirty="0">
+                <a:effectLst/>
+                <a:latin typeface="Calibri" panose="020F0502020204030204" pitchFamily="34" charset="0"/>
+                <a:ea typeface="Times New Roman" panose="02020603050405020304" pitchFamily="18" charset="0"/>
+                <a:cs typeface="Times New Roman" panose="02020603050405020304" pitchFamily="18" charset="0"/>
+              </a:rPr>
+              <a:t>See the code</a:t>
+            </a:r>
+            <a:endParaRPr lang="en-US" sz="2000" dirty="0">
+              <a:solidFill>
+                <a:srgbClr val="FFD579"/>
+              </a:solidFill>
+            </a:endParaRPr>
+          </a:p>
+        </p:txBody>
+      </p:sp>
+      <p:sp>
+        <p:nvSpPr>
+          <p:cNvPr id="8" name="TextBox 7">
+            <a:extLst>
+              <a:ext uri="{FF2B5EF4-FFF2-40B4-BE49-F238E27FC236}">
+                <a16:creationId xmlns:a16="http://schemas.microsoft.com/office/drawing/2014/main" id="{29B7CF77-3BA0-006F-E464-C1B9C71FCB7F}"/>
+              </a:ext>
+            </a:extLst>
+          </p:cNvPr>
+          <p:cNvSpPr txBox="1"/>
+          <p:nvPr/>
+        </p:nvSpPr>
+        <p:spPr>
+          <a:xfrm>
+            <a:off x="3907483" y="2519126"/>
+            <a:ext cx="3538010" cy="840230"/>
+          </a:xfrm>
+          <a:prstGeom prst="rect">
+            <a:avLst/>
+          </a:prstGeom>
+          <a:solidFill>
+            <a:schemeClr val="accent6"/>
+          </a:solidFill>
+          <a:ln>
+            <a:noFill/>
+          </a:ln>
+        </p:spPr>
+        <p:txBody>
+          <a:bodyPr wrap="square" rtlCol="0">
+            <a:spAutoFit/>
+          </a:bodyPr>
+          <a:lstStyle/>
+          <a:p>
+            <a:pPr algn="l">
+              <a:lnSpc>
+                <a:spcPct val="90000"/>
+              </a:lnSpc>
+              <a:spcBef>
+                <a:spcPts val="1200"/>
+              </a:spcBef>
+            </a:pPr>
+            <a:r>
+              <a:rPr lang="en-GB" sz="1800" dirty="0">
+                <a:solidFill>
+                  <a:schemeClr val="accent1">
+                    <a:lumMod val="60000"/>
+                    <a:lumOff val="40000"/>
+                  </a:schemeClr>
+                </a:solidFill>
+                <a:effectLst/>
+                <a:latin typeface="Calibri" panose="020F0502020204030204" pitchFamily="34" charset="0"/>
+                <a:ea typeface="Times New Roman" panose="02020603050405020304" pitchFamily="18" charset="0"/>
+                <a:cs typeface="Times New Roman" panose="02020603050405020304" pitchFamily="18" charset="0"/>
+              </a:rPr>
+              <a:t>The Fake has more logic in it – it pretends to have som</a:t>
+            </a:r>
+            <a:r>
+              <a:rPr lang="en-GB" dirty="0">
+                <a:solidFill>
+                  <a:schemeClr val="accent1">
+                    <a:lumMod val="60000"/>
+                    <a:lumOff val="40000"/>
+                  </a:schemeClr>
+                </a:solidFill>
+                <a:latin typeface="Calibri" panose="020F0502020204030204" pitchFamily="34" charset="0"/>
+                <a:ea typeface="Times New Roman" panose="02020603050405020304" pitchFamily="18" charset="0"/>
+                <a:cs typeface="Times New Roman" panose="02020603050405020304" pitchFamily="18" charset="0"/>
+              </a:rPr>
+              <a:t>e realistic behaviour</a:t>
+            </a:r>
+            <a:endParaRPr lang="en-US" sz="2000" dirty="0">
+              <a:solidFill>
+                <a:schemeClr val="accent1">
+                  <a:lumMod val="60000"/>
+                  <a:lumOff val="40000"/>
+                </a:schemeClr>
+              </a:solidFill>
+            </a:endParaRPr>
+          </a:p>
+        </p:txBody>
+      </p:sp>
+      <p:sp>
+        <p:nvSpPr>
+          <p:cNvPr id="5" name="TextBox 4">
+            <a:extLst>
+              <a:ext uri="{FF2B5EF4-FFF2-40B4-BE49-F238E27FC236}">
+                <a16:creationId xmlns:a16="http://schemas.microsoft.com/office/drawing/2014/main" id="{E840E896-0AC8-5739-2898-5B35AEAD669A}"/>
+              </a:ext>
+            </a:extLst>
+          </p:cNvPr>
+          <p:cNvSpPr txBox="1"/>
+          <p:nvPr/>
+        </p:nvSpPr>
+        <p:spPr>
+          <a:xfrm>
+            <a:off x="3660184" y="3998528"/>
+            <a:ext cx="6736139" cy="2462213"/>
+          </a:xfrm>
+          <a:prstGeom prst="rect">
+            <a:avLst/>
+          </a:prstGeom>
+          <a:noFill/>
+          <a:ln>
+            <a:solidFill>
+              <a:srgbClr val="FF0000"/>
+            </a:solidFill>
+          </a:ln>
+        </p:spPr>
+        <p:txBody>
+          <a:bodyPr wrap="none" rtlCol="0">
+            <a:spAutoFit/>
+          </a:bodyPr>
+          <a:lstStyle/>
+          <a:p>
+            <a:r>
+              <a:rPr lang="en-GB" sz="1400" dirty="0">
+                <a:solidFill>
+                  <a:srgbClr val="B294BB"/>
+                </a:solidFill>
+                <a:effectLst/>
+                <a:latin typeface="Menlo" panose="020B0609030804020204" pitchFamily="49" charset="0"/>
+              </a:rPr>
+              <a:t>public class </a:t>
+            </a:r>
+            <a:r>
+              <a:rPr lang="en-GB" sz="1400" dirty="0" err="1">
+                <a:solidFill>
+                  <a:srgbClr val="F0C674"/>
+                </a:solidFill>
+                <a:effectLst/>
+                <a:latin typeface="Menlo" panose="020B0609030804020204" pitchFamily="49" charset="0"/>
+              </a:rPr>
+              <a:t>FakeAuthorizer</a:t>
+            </a:r>
+            <a:r>
+              <a:rPr lang="en-GB" sz="1400" dirty="0">
+                <a:solidFill>
+                  <a:srgbClr val="F0C674"/>
+                </a:solidFill>
+                <a:effectLst/>
+                <a:latin typeface="Menlo" panose="020B0609030804020204" pitchFamily="49" charset="0"/>
+              </a:rPr>
+              <a:t> </a:t>
+            </a:r>
+            <a:r>
+              <a:rPr lang="en-GB" sz="1400" dirty="0">
+                <a:solidFill>
+                  <a:srgbClr val="B294BB"/>
+                </a:solidFill>
+                <a:effectLst/>
+                <a:latin typeface="Menlo" panose="020B0609030804020204" pitchFamily="49" charset="0"/>
+              </a:rPr>
+              <a:t>implements </a:t>
+            </a:r>
+            <a:r>
+              <a:rPr lang="en-GB" sz="1400" dirty="0">
+                <a:solidFill>
+                  <a:srgbClr val="CA3E6B"/>
+                </a:solidFill>
+                <a:effectLst/>
+                <a:latin typeface="Menlo" panose="020B0609030804020204" pitchFamily="49" charset="0"/>
+              </a:rPr>
+              <a:t>Authorizer </a:t>
+            </a:r>
+            <a:r>
+              <a:rPr lang="en-GB" sz="1400" dirty="0">
+                <a:solidFill>
+                  <a:srgbClr val="C5C8C6"/>
+                </a:solidFill>
+                <a:effectLst/>
+                <a:latin typeface="Menlo" panose="020B0609030804020204" pitchFamily="49" charset="0"/>
+              </a:rPr>
+              <a:t>{</a:t>
+            </a:r>
+            <a:br>
+              <a:rPr lang="en-GB" sz="1400" dirty="0">
+                <a:solidFill>
+                  <a:srgbClr val="C5C8C6"/>
+                </a:solidFill>
+                <a:effectLst/>
+                <a:latin typeface="Menlo" panose="020B0609030804020204" pitchFamily="49" charset="0"/>
+              </a:rPr>
+            </a:br>
+            <a:r>
+              <a:rPr lang="en-GB" sz="1400" dirty="0">
+                <a:solidFill>
+                  <a:srgbClr val="C5C8C6"/>
+                </a:solidFill>
+                <a:effectLst/>
+                <a:latin typeface="Menlo" panose="020B0609030804020204" pitchFamily="49" charset="0"/>
+              </a:rPr>
+              <a:t>  </a:t>
+            </a:r>
+            <a:r>
+              <a:rPr lang="en-GB" sz="1400" dirty="0">
+                <a:solidFill>
+                  <a:srgbClr val="B294BB"/>
+                </a:solidFill>
+                <a:effectLst/>
+                <a:latin typeface="Menlo" panose="020B0609030804020204" pitchFamily="49" charset="0"/>
+              </a:rPr>
+              <a:t>public </a:t>
+            </a:r>
+            <a:r>
+              <a:rPr lang="en-GB" sz="1400" dirty="0" err="1">
+                <a:solidFill>
+                  <a:srgbClr val="F0C674"/>
+                </a:solidFill>
+                <a:effectLst/>
+                <a:latin typeface="Menlo" panose="020B0609030804020204" pitchFamily="49" charset="0"/>
+              </a:rPr>
+              <a:t>UserID</a:t>
+            </a:r>
+            <a:r>
+              <a:rPr lang="en-GB" sz="1400" dirty="0">
+                <a:solidFill>
+                  <a:srgbClr val="F0C674"/>
+                </a:solidFill>
+                <a:effectLst/>
+                <a:latin typeface="Menlo" panose="020B0609030804020204" pitchFamily="49" charset="0"/>
+              </a:rPr>
+              <a:t> </a:t>
+            </a:r>
+            <a:r>
+              <a:rPr lang="en-GB" sz="1400" dirty="0">
+                <a:solidFill>
+                  <a:srgbClr val="81A2BE"/>
+                </a:solidFill>
+                <a:effectLst/>
+                <a:latin typeface="Menlo" panose="020B0609030804020204" pitchFamily="49" charset="0"/>
+              </a:rPr>
+              <a:t>authorize</a:t>
+            </a:r>
+            <a:r>
+              <a:rPr lang="en-GB" sz="1400" dirty="0">
+                <a:solidFill>
+                  <a:srgbClr val="C5C8C6"/>
+                </a:solidFill>
+                <a:effectLst/>
+                <a:latin typeface="Menlo" panose="020B0609030804020204" pitchFamily="49" charset="0"/>
+              </a:rPr>
+              <a:t>(</a:t>
+            </a:r>
+            <a:r>
+              <a:rPr lang="en-GB" sz="1400" dirty="0">
+                <a:solidFill>
+                  <a:srgbClr val="F0C674"/>
+                </a:solidFill>
+                <a:effectLst/>
+                <a:latin typeface="Menlo" panose="020B0609030804020204" pitchFamily="49" charset="0"/>
+              </a:rPr>
+              <a:t>String </a:t>
+            </a:r>
+            <a:r>
+              <a:rPr lang="en-GB" sz="1400" dirty="0">
+                <a:solidFill>
+                  <a:srgbClr val="DE935F"/>
+                </a:solidFill>
+                <a:effectLst/>
+                <a:latin typeface="Menlo" panose="020B0609030804020204" pitchFamily="49" charset="0"/>
+              </a:rPr>
+              <a:t>username</a:t>
+            </a:r>
+            <a:r>
+              <a:rPr lang="en-GB" sz="1400" dirty="0">
+                <a:solidFill>
+                  <a:srgbClr val="CED1CF"/>
+                </a:solidFill>
+                <a:effectLst/>
+                <a:latin typeface="Menlo" panose="020B0609030804020204" pitchFamily="49" charset="0"/>
+              </a:rPr>
+              <a:t>, </a:t>
+            </a:r>
+            <a:r>
+              <a:rPr lang="en-GB" sz="1400" dirty="0">
+                <a:solidFill>
+                  <a:srgbClr val="F0C674"/>
+                </a:solidFill>
+                <a:effectLst/>
+                <a:latin typeface="Menlo" panose="020B0609030804020204" pitchFamily="49" charset="0"/>
+              </a:rPr>
+              <a:t>String </a:t>
+            </a:r>
+            <a:r>
+              <a:rPr lang="en-GB" sz="1400" dirty="0">
+                <a:solidFill>
+                  <a:srgbClr val="DE935F"/>
+                </a:solidFill>
+                <a:effectLst/>
+                <a:latin typeface="Menlo" panose="020B0609030804020204" pitchFamily="49" charset="0"/>
+              </a:rPr>
+              <a:t>password</a:t>
+            </a:r>
+            <a:r>
+              <a:rPr lang="en-GB" sz="1400" dirty="0">
+                <a:solidFill>
+                  <a:srgbClr val="C5C8C6"/>
+                </a:solidFill>
+                <a:effectLst/>
+                <a:latin typeface="Menlo" panose="020B0609030804020204" pitchFamily="49" charset="0"/>
+              </a:rPr>
+              <a:t>) </a:t>
+            </a:r>
+            <a:r>
+              <a:rPr lang="en-GB" sz="1400" dirty="0">
+                <a:solidFill>
+                  <a:srgbClr val="0E7F8E"/>
+                </a:solidFill>
+                <a:effectLst/>
+                <a:latin typeface="Menlo" panose="020B0609030804020204" pitchFamily="49" charset="0"/>
+              </a:rPr>
+              <a:t>{</a:t>
+            </a:r>
+            <a:br>
+              <a:rPr lang="en-GB" sz="1400" dirty="0">
+                <a:solidFill>
+                  <a:srgbClr val="0E7F8E"/>
+                </a:solidFill>
+                <a:effectLst/>
+                <a:latin typeface="Menlo" panose="020B0609030804020204" pitchFamily="49" charset="0"/>
+              </a:rPr>
+            </a:br>
+            <a:r>
+              <a:rPr lang="en-GB" sz="1400" dirty="0">
+                <a:solidFill>
+                  <a:srgbClr val="0E7F8E"/>
+                </a:solidFill>
+                <a:effectLst/>
+                <a:latin typeface="Menlo" panose="020B0609030804020204" pitchFamily="49" charset="0"/>
+              </a:rPr>
+              <a:t>    </a:t>
+            </a:r>
+            <a:r>
+              <a:rPr lang="en-GB" sz="1400" dirty="0">
+                <a:solidFill>
+                  <a:srgbClr val="B294BB"/>
+                </a:solidFill>
+                <a:effectLst/>
+                <a:latin typeface="Menlo" panose="020B0609030804020204" pitchFamily="49" charset="0"/>
+              </a:rPr>
+              <a:t>if </a:t>
+            </a:r>
+            <a:r>
+              <a:rPr lang="en-GB" sz="1400" dirty="0">
+                <a:solidFill>
+                  <a:srgbClr val="C5C8C6"/>
+                </a:solidFill>
+                <a:effectLst/>
+                <a:latin typeface="Menlo" panose="020B0609030804020204" pitchFamily="49" charset="0"/>
+              </a:rPr>
+              <a:t>(</a:t>
+            </a:r>
+            <a:r>
+              <a:rPr lang="en-GB" sz="1400" dirty="0" err="1">
+                <a:solidFill>
+                  <a:srgbClr val="DE935F"/>
+                </a:solidFill>
+                <a:effectLst/>
+                <a:latin typeface="Menlo" panose="020B0609030804020204" pitchFamily="49" charset="0"/>
+              </a:rPr>
+              <a:t>username</a:t>
+            </a:r>
+            <a:r>
+              <a:rPr lang="en-GB" sz="1400" dirty="0" err="1">
+                <a:solidFill>
+                  <a:srgbClr val="CED1CF"/>
+                </a:solidFill>
+                <a:effectLst/>
+                <a:latin typeface="Menlo" panose="020B0609030804020204" pitchFamily="49" charset="0"/>
+              </a:rPr>
+              <a:t>.</a:t>
+            </a:r>
+            <a:r>
+              <a:rPr lang="en-GB" sz="1400" dirty="0" err="1">
+                <a:solidFill>
+                  <a:srgbClr val="C5C8C6"/>
+                </a:solidFill>
+                <a:effectLst/>
+                <a:latin typeface="Menlo" panose="020B0609030804020204" pitchFamily="49" charset="0"/>
+              </a:rPr>
+              <a:t>toLowerCase</a:t>
+            </a:r>
+            <a:r>
+              <a:rPr lang="en-GB" sz="1400" dirty="0">
+                <a:solidFill>
+                  <a:srgbClr val="C5C8C6"/>
+                </a:solidFill>
+                <a:effectLst/>
+                <a:latin typeface="Menlo" panose="020B0609030804020204" pitchFamily="49" charset="0"/>
+              </a:rPr>
+              <a:t>()</a:t>
+            </a:r>
+            <a:r>
+              <a:rPr lang="en-GB" sz="1400" dirty="0">
+                <a:solidFill>
+                  <a:srgbClr val="CED1CF"/>
+                </a:solidFill>
+                <a:effectLst/>
+                <a:latin typeface="Menlo" panose="020B0609030804020204" pitchFamily="49" charset="0"/>
+              </a:rPr>
+              <a:t>.</a:t>
+            </a:r>
+            <a:r>
+              <a:rPr lang="en-GB" sz="1400" dirty="0" err="1">
+                <a:solidFill>
+                  <a:srgbClr val="C5C8C6"/>
+                </a:solidFill>
+                <a:effectLst/>
+                <a:latin typeface="Menlo" panose="020B0609030804020204" pitchFamily="49" charset="0"/>
+              </a:rPr>
+              <a:t>startsWith</a:t>
+            </a:r>
+            <a:r>
+              <a:rPr lang="en-GB" sz="1400" dirty="0">
+                <a:solidFill>
+                  <a:srgbClr val="0E7F8E"/>
+                </a:solidFill>
+                <a:effectLst/>
+                <a:latin typeface="Menlo" panose="020B0609030804020204" pitchFamily="49" charset="0"/>
+              </a:rPr>
+              <a:t>(</a:t>
+            </a:r>
+            <a:r>
+              <a:rPr lang="en-GB" sz="1400" dirty="0">
+                <a:solidFill>
+                  <a:srgbClr val="B5BD68"/>
+                </a:solidFill>
+                <a:effectLst/>
+                <a:latin typeface="Menlo" panose="020B0609030804020204" pitchFamily="49" charset="0"/>
+              </a:rPr>
+              <a:t>"good"</a:t>
+            </a:r>
+            <a:r>
+              <a:rPr lang="en-GB" sz="1400" dirty="0">
+                <a:solidFill>
+                  <a:srgbClr val="0E7F8E"/>
+                </a:solidFill>
+                <a:effectLst/>
+                <a:latin typeface="Menlo" panose="020B0609030804020204" pitchFamily="49" charset="0"/>
+              </a:rPr>
+              <a:t>)</a:t>
+            </a:r>
+            <a:r>
+              <a:rPr lang="en-GB" sz="1400" dirty="0">
+                <a:solidFill>
+                  <a:srgbClr val="C5C8C6"/>
+                </a:solidFill>
+                <a:effectLst/>
+                <a:latin typeface="Menlo" panose="020B0609030804020204" pitchFamily="49" charset="0"/>
+              </a:rPr>
+              <a:t>)</a:t>
+            </a:r>
+            <a:br>
+              <a:rPr lang="en-GB" sz="1400" dirty="0">
+                <a:solidFill>
+                  <a:srgbClr val="C5C8C6"/>
+                </a:solidFill>
+                <a:effectLst/>
+                <a:latin typeface="Menlo" panose="020B0609030804020204" pitchFamily="49" charset="0"/>
+              </a:rPr>
+            </a:br>
+            <a:r>
+              <a:rPr lang="en-GB" sz="1400" dirty="0">
+                <a:solidFill>
+                  <a:srgbClr val="C5C8C6"/>
+                </a:solidFill>
+                <a:effectLst/>
+                <a:latin typeface="Menlo" panose="020B0609030804020204" pitchFamily="49" charset="0"/>
+              </a:rPr>
+              <a:t>      </a:t>
+            </a:r>
+            <a:r>
+              <a:rPr lang="en-GB" sz="1400" dirty="0">
+                <a:solidFill>
+                  <a:srgbClr val="B294BB"/>
+                </a:solidFill>
+                <a:effectLst/>
+                <a:latin typeface="Menlo" panose="020B0609030804020204" pitchFamily="49" charset="0"/>
+              </a:rPr>
+              <a:t>return new </a:t>
+            </a:r>
+            <a:r>
+              <a:rPr lang="en-GB" sz="1400" dirty="0" err="1">
+                <a:solidFill>
+                  <a:srgbClr val="C5C8C6"/>
+                </a:solidFill>
+                <a:effectLst/>
+                <a:latin typeface="Menlo" panose="020B0609030804020204" pitchFamily="49" charset="0"/>
+              </a:rPr>
+              <a:t>UserID</a:t>
+            </a:r>
+            <a:r>
+              <a:rPr lang="en-GB" sz="1400" dirty="0">
+                <a:solidFill>
+                  <a:srgbClr val="0E7F8E"/>
+                </a:solidFill>
+                <a:effectLst/>
+                <a:latin typeface="Menlo" panose="020B0609030804020204" pitchFamily="49" charset="0"/>
+              </a:rPr>
+              <a:t>(</a:t>
+            </a:r>
+            <a:r>
+              <a:rPr lang="en-GB" sz="1400" dirty="0">
+                <a:solidFill>
+                  <a:srgbClr val="8ABEB7"/>
+                </a:solidFill>
+                <a:effectLst/>
+                <a:latin typeface="Menlo" panose="020B0609030804020204" pitchFamily="49" charset="0"/>
+              </a:rPr>
+              <a:t>1</a:t>
+            </a:r>
+            <a:r>
+              <a:rPr lang="en-GB" sz="1400" dirty="0">
+                <a:solidFill>
+                  <a:srgbClr val="0E7F8E"/>
+                </a:solidFill>
+                <a:effectLst/>
+                <a:latin typeface="Menlo" panose="020B0609030804020204" pitchFamily="49" charset="0"/>
+              </a:rPr>
+              <a:t>)</a:t>
+            </a:r>
+            <a:r>
+              <a:rPr lang="en-GB" sz="1400" dirty="0">
+                <a:solidFill>
+                  <a:srgbClr val="CED1CF"/>
+                </a:solidFill>
+                <a:effectLst/>
+                <a:latin typeface="Menlo" panose="020B0609030804020204" pitchFamily="49" charset="0"/>
+              </a:rPr>
+              <a:t>;</a:t>
+            </a:r>
+            <a:br>
+              <a:rPr lang="en-GB" sz="1400" dirty="0">
+                <a:solidFill>
+                  <a:srgbClr val="CED1CF"/>
+                </a:solidFill>
+                <a:effectLst/>
+                <a:latin typeface="Menlo" panose="020B0609030804020204" pitchFamily="49" charset="0"/>
+              </a:rPr>
+            </a:br>
+            <a:r>
+              <a:rPr lang="en-GB" sz="1400" dirty="0">
+                <a:solidFill>
+                  <a:srgbClr val="CED1CF"/>
+                </a:solidFill>
+                <a:effectLst/>
+                <a:latin typeface="Menlo" panose="020B0609030804020204" pitchFamily="49" charset="0"/>
+              </a:rPr>
+              <a:t>    </a:t>
+            </a:r>
+            <a:r>
+              <a:rPr lang="en-GB" sz="1400" dirty="0">
+                <a:solidFill>
+                  <a:srgbClr val="B294BB"/>
+                </a:solidFill>
+                <a:effectLst/>
+                <a:latin typeface="Menlo" panose="020B0609030804020204" pitchFamily="49" charset="0"/>
+              </a:rPr>
+              <a:t>else</a:t>
+            </a:r>
+            <a:br>
+              <a:rPr lang="en-GB" sz="1400" dirty="0">
+                <a:solidFill>
+                  <a:srgbClr val="B294BB"/>
+                </a:solidFill>
+                <a:effectLst/>
+                <a:latin typeface="Menlo" panose="020B0609030804020204" pitchFamily="49" charset="0"/>
+              </a:rPr>
+            </a:br>
+            <a:r>
+              <a:rPr lang="en-GB" sz="1400" dirty="0">
+                <a:solidFill>
+                  <a:srgbClr val="B294BB"/>
+                </a:solidFill>
+                <a:effectLst/>
+                <a:latin typeface="Menlo" panose="020B0609030804020204" pitchFamily="49" charset="0"/>
+              </a:rPr>
+              <a:t>      return new </a:t>
+            </a:r>
+            <a:r>
+              <a:rPr lang="en-GB" sz="1400" dirty="0" err="1">
+                <a:solidFill>
+                  <a:srgbClr val="C5C8C6"/>
+                </a:solidFill>
+                <a:effectLst/>
+                <a:latin typeface="Menlo" panose="020B0609030804020204" pitchFamily="49" charset="0"/>
+              </a:rPr>
+              <a:t>InvalidUserID</a:t>
+            </a:r>
+            <a:r>
+              <a:rPr lang="en-GB" sz="1400" dirty="0">
+                <a:solidFill>
+                  <a:srgbClr val="C5C8C6"/>
+                </a:solidFill>
+                <a:effectLst/>
+                <a:latin typeface="Menlo" panose="020B0609030804020204" pitchFamily="49" charset="0"/>
+              </a:rPr>
+              <a:t>()</a:t>
+            </a:r>
+            <a:r>
+              <a:rPr lang="en-GB" sz="1400" dirty="0">
+                <a:solidFill>
+                  <a:srgbClr val="CED1CF"/>
+                </a:solidFill>
+                <a:effectLst/>
+                <a:latin typeface="Menlo" panose="020B0609030804020204" pitchFamily="49" charset="0"/>
+              </a:rPr>
+              <a:t>;</a:t>
+            </a:r>
+            <a:br>
+              <a:rPr lang="en-GB" sz="1400" dirty="0">
+                <a:solidFill>
+                  <a:srgbClr val="CED1CF"/>
+                </a:solidFill>
+                <a:effectLst/>
+                <a:latin typeface="Menlo" panose="020B0609030804020204" pitchFamily="49" charset="0"/>
+              </a:rPr>
+            </a:br>
+            <a:r>
+              <a:rPr lang="en-GB" sz="1400" dirty="0">
+                <a:solidFill>
+                  <a:srgbClr val="CED1CF"/>
+                </a:solidFill>
+                <a:effectLst/>
+                <a:latin typeface="Menlo" panose="020B0609030804020204" pitchFamily="49" charset="0"/>
+              </a:rPr>
+              <a:t>  </a:t>
+            </a:r>
+            <a:r>
+              <a:rPr lang="en-GB" sz="1400" dirty="0">
+                <a:solidFill>
+                  <a:srgbClr val="0E7F8E"/>
+                </a:solidFill>
+                <a:effectLst/>
+                <a:latin typeface="Menlo" panose="020B0609030804020204" pitchFamily="49" charset="0"/>
+              </a:rPr>
+              <a:t>}</a:t>
+            </a:r>
+            <a:br>
+              <a:rPr lang="en-GB" sz="1400" dirty="0">
+                <a:solidFill>
+                  <a:srgbClr val="0E7F8E"/>
+                </a:solidFill>
+                <a:effectLst/>
+                <a:latin typeface="Menlo" panose="020B0609030804020204" pitchFamily="49" charset="0"/>
+              </a:rPr>
+            </a:br>
+            <a:br>
+              <a:rPr lang="en-GB" sz="1400" dirty="0">
+                <a:solidFill>
+                  <a:srgbClr val="0E7F8E"/>
+                </a:solidFill>
+                <a:effectLst/>
+                <a:latin typeface="Menlo" panose="020B0609030804020204" pitchFamily="49" charset="0"/>
+              </a:rPr>
+            </a:br>
+            <a:r>
+              <a:rPr lang="en-GB" sz="1400" dirty="0">
+                <a:solidFill>
+                  <a:srgbClr val="0E7F8E"/>
+                </a:solidFill>
+                <a:effectLst/>
+                <a:latin typeface="Menlo" panose="020B0609030804020204" pitchFamily="49" charset="0"/>
+              </a:rPr>
+              <a:t>  </a:t>
+            </a:r>
+            <a:r>
+              <a:rPr lang="en-GB" sz="1400" dirty="0">
+                <a:solidFill>
+                  <a:srgbClr val="B294BB"/>
+                </a:solidFill>
+                <a:effectLst/>
+                <a:latin typeface="Menlo" panose="020B0609030804020204" pitchFamily="49" charset="0"/>
+              </a:rPr>
+              <a:t>public void </a:t>
+            </a:r>
+            <a:r>
+              <a:rPr lang="en-GB" sz="1400" dirty="0">
+                <a:solidFill>
+                  <a:srgbClr val="81A2BE"/>
+                </a:solidFill>
+                <a:effectLst/>
+                <a:latin typeface="Menlo" panose="020B0609030804020204" pitchFamily="49" charset="0"/>
+              </a:rPr>
+              <a:t>hold</a:t>
+            </a:r>
+            <a:r>
+              <a:rPr lang="en-GB" sz="1400" dirty="0">
+                <a:solidFill>
+                  <a:srgbClr val="C5C8C6"/>
+                </a:solidFill>
+                <a:effectLst/>
+                <a:latin typeface="Menlo" panose="020B0609030804020204" pitchFamily="49" charset="0"/>
+              </a:rPr>
+              <a:t>(</a:t>
+            </a:r>
+            <a:r>
+              <a:rPr lang="en-GB" sz="1400" dirty="0">
+                <a:solidFill>
+                  <a:srgbClr val="F0C674"/>
+                </a:solidFill>
+                <a:effectLst/>
+                <a:latin typeface="Menlo" panose="020B0609030804020204" pitchFamily="49" charset="0"/>
+              </a:rPr>
+              <a:t>String </a:t>
+            </a:r>
+            <a:r>
+              <a:rPr lang="en-GB" sz="1400" dirty="0">
+                <a:solidFill>
+                  <a:srgbClr val="DE935F"/>
+                </a:solidFill>
+                <a:effectLst/>
+                <a:latin typeface="Menlo" panose="020B0609030804020204" pitchFamily="49" charset="0"/>
+              </a:rPr>
+              <a:t>username</a:t>
+            </a:r>
+            <a:r>
+              <a:rPr lang="en-GB" sz="1400" dirty="0">
+                <a:solidFill>
+                  <a:srgbClr val="C5C8C6"/>
+                </a:solidFill>
+                <a:effectLst/>
+                <a:latin typeface="Menlo" panose="020B0609030804020204" pitchFamily="49" charset="0"/>
+              </a:rPr>
+              <a:t>) </a:t>
+            </a:r>
+            <a:r>
+              <a:rPr lang="en-GB" sz="1400" dirty="0">
+                <a:solidFill>
+                  <a:srgbClr val="0E7F8E"/>
+                </a:solidFill>
+                <a:effectLst/>
+                <a:latin typeface="Menlo" panose="020B0609030804020204" pitchFamily="49" charset="0"/>
+              </a:rPr>
+              <a:t>{</a:t>
+            </a:r>
+            <a:br>
+              <a:rPr lang="en-GB" sz="1400" dirty="0">
+                <a:solidFill>
+                  <a:srgbClr val="0E7F8E"/>
+                </a:solidFill>
+                <a:effectLst/>
+                <a:latin typeface="Menlo" panose="020B0609030804020204" pitchFamily="49" charset="0"/>
+              </a:rPr>
+            </a:br>
+            <a:r>
+              <a:rPr lang="en-GB" sz="1400" dirty="0">
+                <a:solidFill>
+                  <a:srgbClr val="0E7F8E"/>
+                </a:solidFill>
+                <a:effectLst/>
+                <a:latin typeface="Menlo" panose="020B0609030804020204" pitchFamily="49" charset="0"/>
+              </a:rPr>
+              <a:t>  }</a:t>
+            </a:r>
+            <a:br>
+              <a:rPr lang="en-GB" sz="1400" dirty="0">
+                <a:solidFill>
+                  <a:srgbClr val="0E7F8E"/>
+                </a:solidFill>
+                <a:effectLst/>
+                <a:latin typeface="Menlo" panose="020B0609030804020204" pitchFamily="49" charset="0"/>
+              </a:rPr>
+            </a:br>
+            <a:r>
+              <a:rPr lang="en-GB" sz="1400" dirty="0">
+                <a:solidFill>
+                  <a:srgbClr val="C5C8C6"/>
+                </a:solidFill>
+                <a:effectLst/>
+                <a:latin typeface="Menlo" panose="020B0609030804020204" pitchFamily="49" charset="0"/>
+              </a:rPr>
+              <a:t>}</a:t>
+            </a:r>
+          </a:p>
+        </p:txBody>
+      </p:sp>
+      <p:sp>
+        <p:nvSpPr>
+          <p:cNvPr id="9" name="TextBox 8">
+            <a:extLst>
+              <a:ext uri="{FF2B5EF4-FFF2-40B4-BE49-F238E27FC236}">
+                <a16:creationId xmlns:a16="http://schemas.microsoft.com/office/drawing/2014/main" id="{DFFA3928-B515-6912-30DC-116982D5BF07}"/>
+              </a:ext>
+            </a:extLst>
+          </p:cNvPr>
+          <p:cNvSpPr txBox="1"/>
+          <p:nvPr/>
+        </p:nvSpPr>
+        <p:spPr>
+          <a:xfrm>
+            <a:off x="7824192" y="2219313"/>
+            <a:ext cx="3538010" cy="1588127"/>
+          </a:xfrm>
+          <a:prstGeom prst="rect">
+            <a:avLst/>
+          </a:prstGeom>
+          <a:solidFill>
+            <a:srgbClr val="7030A0"/>
+          </a:solidFill>
+          <a:ln>
+            <a:noFill/>
+          </a:ln>
+        </p:spPr>
+        <p:txBody>
+          <a:bodyPr wrap="square" rtlCol="0">
+            <a:spAutoFit/>
+          </a:bodyPr>
+          <a:lstStyle/>
+          <a:p>
+            <a:pPr algn="l">
+              <a:lnSpc>
+                <a:spcPct val="90000"/>
+              </a:lnSpc>
+              <a:spcBef>
+                <a:spcPts val="1200"/>
+              </a:spcBef>
+            </a:pPr>
+            <a:r>
+              <a:rPr lang="en-GB" sz="1800" dirty="0">
+                <a:solidFill>
+                  <a:schemeClr val="accent1">
+                    <a:lumMod val="60000"/>
+                    <a:lumOff val="40000"/>
+                  </a:schemeClr>
+                </a:solidFill>
+                <a:effectLst/>
+                <a:latin typeface="Calibri" panose="020F0502020204030204" pitchFamily="34" charset="0"/>
+                <a:ea typeface="Times New Roman" panose="02020603050405020304" pitchFamily="18" charset="0"/>
+                <a:cs typeface="Times New Roman" panose="02020603050405020304" pitchFamily="18" charset="0"/>
+              </a:rPr>
+              <a:t>The Fakes can get very complicated to the point where you need tests for your Fake. You should be able to do most of your testing without a Fake – Useful for Integration Tests, </a:t>
+            </a:r>
+            <a:r>
+              <a:rPr lang="en-GB" sz="1800" dirty="0">
+                <a:solidFill>
+                  <a:schemeClr val="accent1">
+                    <a:lumMod val="60000"/>
+                    <a:lumOff val="40000"/>
+                  </a:schemeClr>
+                </a:solidFill>
+                <a:effectLst/>
+                <a:highlight>
+                  <a:srgbClr val="00FF00"/>
+                </a:highlight>
+                <a:latin typeface="Calibri" panose="020F0502020204030204" pitchFamily="34" charset="0"/>
+                <a:ea typeface="Times New Roman" panose="02020603050405020304" pitchFamily="18" charset="0"/>
+                <a:cs typeface="Times New Roman" panose="02020603050405020304" pitchFamily="18" charset="0"/>
+              </a:rPr>
+              <a:t>but avoid if possible</a:t>
+            </a:r>
+            <a:endParaRPr lang="en-US" sz="2000" dirty="0">
+              <a:solidFill>
+                <a:schemeClr val="accent1">
+                  <a:lumMod val="60000"/>
+                  <a:lumOff val="40000"/>
+                </a:schemeClr>
+              </a:solidFill>
+              <a:highlight>
+                <a:srgbClr val="00FF00"/>
+              </a:highlight>
+            </a:endParaRPr>
+          </a:p>
+        </p:txBody>
+      </p:sp>
+    </p:spTree>
+    <p:extLst>
+      <p:ext uri="{BB962C8B-B14F-4D97-AF65-F5344CB8AC3E}">
+        <p14:creationId xmlns:p14="http://schemas.microsoft.com/office/powerpoint/2010/main" val="1628950400"/>
+      </p:ext>
+    </p:extLst>
+  </p:cSld>
+  <p:clrMapOvr>
+    <a:masterClrMapping/>
+  </p:clrMapOvr>
+  <p:transition>
+    <p:fade/>
+  </p:transition>
+</p:sld>
+</file>
+
+<file path=ppt/slides/slide14.xml><?xml version="1.0" encoding="utf-8"?>
 <p:sld xmlns:a="http://schemas.openxmlformats.org/drawingml/2006/main" xmlns:r="http://schemas.openxmlformats.org/officeDocument/2006/relationships" xmlns:p="http://schemas.openxmlformats.org/presentationml/2006/main">
   <p:cSld>
     <p:spTree>
@@ -12968,12 +14713,32 @@
 </file>
 
 <file path=customXml/item1.xml><?xml version="1.0" encoding="utf-8"?>
-<?mso-contentType ?>
-<FormTemplates xmlns="http://schemas.microsoft.com/sharepoint/v3/contenttype/forms">
-  <Display>DocumentLibraryForm</Display>
-  <Edit>DocumentLibraryForm</Edit>
-  <New>DocumentLibraryForm</New>
-</FormTemplates>
+<p:properties xmlns:p="http://schemas.microsoft.com/office/2006/metadata/properties" xmlns:xsi="http://www.w3.org/2001/XMLSchema-instance" xmlns:pc="http://schemas.microsoft.com/office/infopath/2007/PartnerControls">
+  <documentManagement>
+    <SharedWithUsers xmlns="846e726d-930d-4acb-bd80-f2077a598691">
+      <UserInfo>
+        <DisplayName>Rohit Rahim</DisplayName>
+        <AccountId>76190</AccountId>
+        <AccountType/>
+      </UserInfo>
+      <UserInfo>
+        <DisplayName>Leo Zhang</DisplayName>
+        <AccountId>76198</AccountId>
+        <AccountType/>
+      </UserInfo>
+      <UserInfo>
+        <DisplayName>Ebony Cherry</DisplayName>
+        <AccountId>76895</AccountId>
+        <AccountType/>
+      </UserInfo>
+      <UserInfo>
+        <DisplayName>Joan Castro</DisplayName>
+        <AccountId>76253</AccountId>
+        <AccountType/>
+      </UserInfo>
+    </SharedWithUsers>
+  </documentManagement>
+</p:properties>
 </file>
 
 <file path=customXml/item2.xml><?xml version="1.0" encoding="utf-8"?>
@@ -13142,38 +14907,20 @@
 </file>
 
 <file path=customXml/item3.xml><?xml version="1.0" encoding="utf-8"?>
-<p:properties xmlns:p="http://schemas.microsoft.com/office/2006/metadata/properties" xmlns:xsi="http://www.w3.org/2001/XMLSchema-instance" xmlns:pc="http://schemas.microsoft.com/office/infopath/2007/PartnerControls">
-  <documentManagement>
-    <SharedWithUsers xmlns="846e726d-930d-4acb-bd80-f2077a598691">
-      <UserInfo>
-        <DisplayName>Rohit Rahim</DisplayName>
-        <AccountId>76190</AccountId>
-        <AccountType/>
-      </UserInfo>
-      <UserInfo>
-        <DisplayName>Leo Zhang</DisplayName>
-        <AccountId>76198</AccountId>
-        <AccountType/>
-      </UserInfo>
-      <UserInfo>
-        <DisplayName>Ebony Cherry</DisplayName>
-        <AccountId>76895</AccountId>
-        <AccountType/>
-      </UserInfo>
-      <UserInfo>
-        <DisplayName>Joan Castro</DisplayName>
-        <AccountId>76253</AccountId>
-        <AccountType/>
-      </UserInfo>
-    </SharedWithUsers>
-  </documentManagement>
-</p:properties>
+<?mso-contentType ?>
+<FormTemplates xmlns="http://schemas.microsoft.com/sharepoint/v3/contenttype/forms">
+  <Display>DocumentLibraryForm</Display>
+  <Edit>DocumentLibraryForm</Edit>
+  <New>DocumentLibraryForm</New>
+</FormTemplates>
 </file>
 
 <file path=customXml/itemProps1.xml><?xml version="1.0" encoding="utf-8"?>
-<ds:datastoreItem xmlns:ds="http://schemas.openxmlformats.org/officeDocument/2006/customXml" ds:itemID="{07F4FCAA-B58A-4119-AACD-7D2BC6BC457B}">
+<ds:datastoreItem xmlns:ds="http://schemas.openxmlformats.org/officeDocument/2006/customXml" ds:itemID="{4F26828B-8021-40B0-BE6F-5F8BAA7A8160}">
   <ds:schemaRefs>
-    <ds:schemaRef ds:uri="http://schemas.microsoft.com/sharepoint/v3/contenttype/forms"/>
+    <ds:schemaRef ds:uri="http://schemas.microsoft.com/office/2006/metadata/properties"/>
+    <ds:schemaRef ds:uri="http://schemas.microsoft.com/office/infopath/2007/PartnerControls"/>
+    <ds:schemaRef ds:uri="846e726d-930d-4acb-bd80-f2077a598691"/>
   </ds:schemaRefs>
 </ds:datastoreItem>
 </file>
@@ -13198,11 +14945,9 @@
 </file>
 
 <file path=customXml/itemProps3.xml><?xml version="1.0" encoding="utf-8"?>
-<ds:datastoreItem xmlns:ds="http://schemas.openxmlformats.org/officeDocument/2006/customXml" ds:itemID="{4F26828B-8021-40B0-BE6F-5F8BAA7A8160}">
+<ds:datastoreItem xmlns:ds="http://schemas.openxmlformats.org/officeDocument/2006/customXml" ds:itemID="{07F4FCAA-B58A-4119-AACD-7D2BC6BC457B}">
   <ds:schemaRefs>
-    <ds:schemaRef ds:uri="http://schemas.microsoft.com/office/2006/metadata/properties"/>
-    <ds:schemaRef ds:uri="http://schemas.microsoft.com/office/infopath/2007/PartnerControls"/>
-    <ds:schemaRef ds:uri="846e726d-930d-4acb-bd80-f2077a598691"/>
+    <ds:schemaRef ds:uri="http://schemas.microsoft.com/sharepoint/v3/contenttype/forms"/>
   </ds:schemaRefs>
 </ds:datastoreItem>
 </file>
</xml_diff>